<commit_message>
Retouche finale projet Bluel
</commit_message>
<xml_diff>
--- a/Bluel.pptx
+++ b/Bluel.pptx
@@ -8,34 +8,35 @@
     <p:sldId id="257" r:id="rId2"/>
     <p:sldId id="261" r:id="rId3"/>
     <p:sldId id="262" r:id="rId4"/>
-    <p:sldId id="263" r:id="rId5"/>
-    <p:sldId id="288" r:id="rId6"/>
-    <p:sldId id="264" r:id="rId7"/>
-    <p:sldId id="265" r:id="rId8"/>
-    <p:sldId id="289" r:id="rId9"/>
-    <p:sldId id="266" r:id="rId10"/>
-    <p:sldId id="267" r:id="rId11"/>
-    <p:sldId id="281" r:id="rId12"/>
-    <p:sldId id="282" r:id="rId13"/>
-    <p:sldId id="290" r:id="rId14"/>
-    <p:sldId id="268" r:id="rId15"/>
-    <p:sldId id="283" r:id="rId16"/>
-    <p:sldId id="284" r:id="rId17"/>
-    <p:sldId id="291" r:id="rId18"/>
-    <p:sldId id="269" r:id="rId19"/>
-    <p:sldId id="285" r:id="rId20"/>
-    <p:sldId id="286" r:id="rId21"/>
-    <p:sldId id="292" r:id="rId22"/>
-    <p:sldId id="293" r:id="rId23"/>
-    <p:sldId id="294" r:id="rId24"/>
-    <p:sldId id="295" r:id="rId25"/>
-    <p:sldId id="296" r:id="rId26"/>
-    <p:sldId id="297" r:id="rId27"/>
-    <p:sldId id="298" r:id="rId28"/>
-    <p:sldId id="278" r:id="rId29"/>
-    <p:sldId id="279" r:id="rId30"/>
-    <p:sldId id="287" r:id="rId31"/>
-    <p:sldId id="280" r:id="rId32"/>
+    <p:sldId id="299" r:id="rId5"/>
+    <p:sldId id="263" r:id="rId6"/>
+    <p:sldId id="288" r:id="rId7"/>
+    <p:sldId id="264" r:id="rId8"/>
+    <p:sldId id="265" r:id="rId9"/>
+    <p:sldId id="289" r:id="rId10"/>
+    <p:sldId id="266" r:id="rId11"/>
+    <p:sldId id="267" r:id="rId12"/>
+    <p:sldId id="281" r:id="rId13"/>
+    <p:sldId id="282" r:id="rId14"/>
+    <p:sldId id="290" r:id="rId15"/>
+    <p:sldId id="268" r:id="rId16"/>
+    <p:sldId id="283" r:id="rId17"/>
+    <p:sldId id="284" r:id="rId18"/>
+    <p:sldId id="291" r:id="rId19"/>
+    <p:sldId id="269" r:id="rId20"/>
+    <p:sldId id="285" r:id="rId21"/>
+    <p:sldId id="286" r:id="rId22"/>
+    <p:sldId id="292" r:id="rId23"/>
+    <p:sldId id="293" r:id="rId24"/>
+    <p:sldId id="294" r:id="rId25"/>
+    <p:sldId id="295" r:id="rId26"/>
+    <p:sldId id="296" r:id="rId27"/>
+    <p:sldId id="297" r:id="rId28"/>
+    <p:sldId id="298" r:id="rId29"/>
+    <p:sldId id="278" r:id="rId30"/>
+    <p:sldId id="279" r:id="rId31"/>
+    <p:sldId id="287" r:id="rId32"/>
+    <p:sldId id="280" r:id="rId33"/>
   </p:sldIdLst>
   <p:sldSz cx="12192000" cy="6858000"/>
   <p:notesSz cx="6858000" cy="9144000"/>
@@ -273,7 +274,7 @@
           <a:p>
             <a:fld id="{6A8EF467-8487-4230-8827-197FCF02D652}" type="datetimeFigureOut">
               <a:rPr lang="en-US" smtClean="0"/>
-              <a:t>2/27/2023</a:t>
+              <a:t>3/15/2023</a:t>
             </a:fld>
             <a:endParaRPr lang="en-US"/>
           </a:p>
@@ -443,7 +444,7 @@
           <a:p>
             <a:fld id="{6A8EF467-8487-4230-8827-197FCF02D652}" type="datetimeFigureOut">
               <a:rPr lang="en-US" smtClean="0"/>
-              <a:t>2/27/2023</a:t>
+              <a:t>3/15/2023</a:t>
             </a:fld>
             <a:endParaRPr lang="en-US"/>
           </a:p>
@@ -623,7 +624,7 @@
           <a:p>
             <a:fld id="{6A8EF467-8487-4230-8827-197FCF02D652}" type="datetimeFigureOut">
               <a:rPr lang="en-US" smtClean="0"/>
-              <a:t>2/27/2023</a:t>
+              <a:t>3/15/2023</a:t>
             </a:fld>
             <a:endParaRPr lang="en-US"/>
           </a:p>
@@ -793,7 +794,7 @@
           <a:p>
             <a:fld id="{6A8EF467-8487-4230-8827-197FCF02D652}" type="datetimeFigureOut">
               <a:rPr lang="en-US" smtClean="0"/>
-              <a:t>2/27/2023</a:t>
+              <a:t>3/15/2023</a:t>
             </a:fld>
             <a:endParaRPr lang="en-US"/>
           </a:p>
@@ -1039,7 +1040,7 @@
           <a:p>
             <a:fld id="{6A8EF467-8487-4230-8827-197FCF02D652}" type="datetimeFigureOut">
               <a:rPr lang="en-US" smtClean="0"/>
-              <a:t>2/27/2023</a:t>
+              <a:t>3/15/2023</a:t>
             </a:fld>
             <a:endParaRPr lang="en-US"/>
           </a:p>
@@ -1271,7 +1272,7 @@
           <a:p>
             <a:fld id="{6A8EF467-8487-4230-8827-197FCF02D652}" type="datetimeFigureOut">
               <a:rPr lang="en-US" smtClean="0"/>
-              <a:t>2/27/2023</a:t>
+              <a:t>3/15/2023</a:t>
             </a:fld>
             <a:endParaRPr lang="en-US"/>
           </a:p>
@@ -1638,7 +1639,7 @@
           <a:p>
             <a:fld id="{6A8EF467-8487-4230-8827-197FCF02D652}" type="datetimeFigureOut">
               <a:rPr lang="en-US" smtClean="0"/>
-              <a:t>2/27/2023</a:t>
+              <a:t>3/15/2023</a:t>
             </a:fld>
             <a:endParaRPr lang="en-US"/>
           </a:p>
@@ -1756,7 +1757,7 @@
           <a:p>
             <a:fld id="{6A8EF467-8487-4230-8827-197FCF02D652}" type="datetimeFigureOut">
               <a:rPr lang="en-US" smtClean="0"/>
-              <a:t>2/27/2023</a:t>
+              <a:t>3/15/2023</a:t>
             </a:fld>
             <a:endParaRPr lang="en-US"/>
           </a:p>
@@ -1851,7 +1852,7 @@
           <a:p>
             <a:fld id="{6A8EF467-8487-4230-8827-197FCF02D652}" type="datetimeFigureOut">
               <a:rPr lang="en-US" smtClean="0"/>
-              <a:t>2/27/2023</a:t>
+              <a:t>3/15/2023</a:t>
             </a:fld>
             <a:endParaRPr lang="en-US"/>
           </a:p>
@@ -2128,7 +2129,7 @@
           <a:p>
             <a:fld id="{6A8EF467-8487-4230-8827-197FCF02D652}" type="datetimeFigureOut">
               <a:rPr lang="en-US" smtClean="0"/>
-              <a:t>2/27/2023</a:t>
+              <a:t>3/15/2023</a:t>
             </a:fld>
             <a:endParaRPr lang="en-US"/>
           </a:p>
@@ -2385,7 +2386,7 @@
           <a:p>
             <a:fld id="{6A8EF467-8487-4230-8827-197FCF02D652}" type="datetimeFigureOut">
               <a:rPr lang="en-US" smtClean="0"/>
-              <a:t>2/27/2023</a:t>
+              <a:t>3/15/2023</a:t>
             </a:fld>
             <a:endParaRPr lang="en-US"/>
           </a:p>
@@ -2598,7 +2599,7 @@
           <a:p>
             <a:fld id="{6A8EF467-8487-4230-8827-197FCF02D652}" type="datetimeFigureOut">
               <a:rPr lang="en-US" smtClean="0"/>
-              <a:t>2/27/2023</a:t>
+              <a:t>3/15/2023</a:t>
             </a:fld>
             <a:endParaRPr lang="en-US"/>
           </a:p>
@@ -3144,7 +3145,7 @@
                 </a:solidFill>
                 <a:latin typeface="Copperplate Gothic Bold" panose="020E0705020206020404" pitchFamily="34" charset="0"/>
               </a:rPr>
-              <a:t>LA PARTIE CODE PC</a:t>
+              <a:t>LE FILTRE DES PROJETS</a:t>
             </a:r>
             <a:endParaRPr lang="en-US" dirty="0">
               <a:solidFill>
@@ -3219,7 +3220,7 @@
                 <a:ea typeface="+mn-ea"/>
                 <a:cs typeface="+mn-cs"/>
               </a:rPr>
-              <a:t>II/ Le javascript</a:t>
+              <a:t>I/Le HTML</a:t>
             </a:r>
             <a:endParaRPr kumimoji="0" lang="en-US" sz="2400" b="1" i="0" u="sng" strike="noStrike" kern="1200" cap="none" spc="0" normalizeH="0" baseline="0" noProof="0" dirty="0">
               <a:ln>
@@ -3242,10 +3243,10 @@
       </p:sp>
       <p:pic>
         <p:nvPicPr>
-          <p:cNvPr id="4" name="Image 3">
-            <a:extLst>
-              <a:ext uri="{FF2B5EF4-FFF2-40B4-BE49-F238E27FC236}">
-                <a16:creationId xmlns:a16="http://schemas.microsoft.com/office/drawing/2014/main" id="{EE649306-BAB9-32DD-A512-66912C694658}"/>
+          <p:cNvPr id="6" name="Image 5">
+            <a:extLst>
+              <a:ext uri="{FF2B5EF4-FFF2-40B4-BE49-F238E27FC236}">
+                <a16:creationId xmlns:a16="http://schemas.microsoft.com/office/drawing/2014/main" id="{C4B982D0-B906-F53D-06CF-9B17D530712E}"/>
               </a:ext>
             </a:extLst>
           </p:cNvPr>
@@ -3262,8 +3263,8 @@
         </p:blipFill>
         <p:spPr>
           <a:xfrm>
-            <a:off x="3429871" y="2272435"/>
-            <a:ext cx="5332258" cy="4236937"/>
+            <a:off x="1656730" y="2766920"/>
+            <a:ext cx="8878539" cy="1324160"/>
           </a:xfrm>
           <a:prstGeom prst="rect">
             <a:avLst/>
@@ -3273,7 +3274,7 @@
     </p:spTree>
     <p:extLst>
       <p:ext uri="{BB962C8B-B14F-4D97-AF65-F5344CB8AC3E}">
-        <p14:creationId xmlns:p14="http://schemas.microsoft.com/office/powerpoint/2010/main" val="2430957649"/>
+        <p14:creationId xmlns:p14="http://schemas.microsoft.com/office/powerpoint/2010/main" val="3176178817"/>
       </p:ext>
     </p:extLst>
   </p:cSld>
@@ -3444,7 +3445,7 @@
           <p:cNvPr id="4" name="Image 3">
             <a:extLst>
               <a:ext uri="{FF2B5EF4-FFF2-40B4-BE49-F238E27FC236}">
-                <a16:creationId xmlns:a16="http://schemas.microsoft.com/office/drawing/2014/main" id="{E0A32BEE-79B7-EC93-B7CF-8D4B7654436B}"/>
+                <a16:creationId xmlns:a16="http://schemas.microsoft.com/office/drawing/2014/main" id="{EE649306-BAB9-32DD-A512-66912C694658}"/>
               </a:ext>
             </a:extLst>
           </p:cNvPr>
@@ -3461,8 +3462,8 @@
         </p:blipFill>
         <p:spPr>
           <a:xfrm>
-            <a:off x="4001678" y="2026514"/>
-            <a:ext cx="4901588" cy="4576021"/>
+            <a:off x="3429871" y="2272435"/>
+            <a:ext cx="5332258" cy="4236937"/>
           </a:xfrm>
           <a:prstGeom prst="rect">
             <a:avLst/>
@@ -3472,7 +3473,7 @@
     </p:spTree>
     <p:extLst>
       <p:ext uri="{BB962C8B-B14F-4D97-AF65-F5344CB8AC3E}">
-        <p14:creationId xmlns:p14="http://schemas.microsoft.com/office/powerpoint/2010/main" val="2405409819"/>
+        <p14:creationId xmlns:p14="http://schemas.microsoft.com/office/powerpoint/2010/main" val="2430957649"/>
       </p:ext>
     </p:extLst>
   </p:cSld>
@@ -3643,7 +3644,7 @@
           <p:cNvPr id="4" name="Image 3">
             <a:extLst>
               <a:ext uri="{FF2B5EF4-FFF2-40B4-BE49-F238E27FC236}">
-                <a16:creationId xmlns:a16="http://schemas.microsoft.com/office/drawing/2014/main" id="{4159EAF7-BF2A-6088-7B29-4060DEEAEA67}"/>
+                <a16:creationId xmlns:a16="http://schemas.microsoft.com/office/drawing/2014/main" id="{E0A32BEE-79B7-EC93-B7CF-8D4B7654436B}"/>
               </a:ext>
             </a:extLst>
           </p:cNvPr>
@@ -3660,38 +3661,8 @@
         </p:blipFill>
         <p:spPr>
           <a:xfrm>
-            <a:off x="838200" y="2562772"/>
-            <a:ext cx="5630061" cy="3410426"/>
-          </a:xfrm>
-          <a:prstGeom prst="rect">
-            <a:avLst/>
-          </a:prstGeom>
-        </p:spPr>
-      </p:pic>
-      <p:pic>
-        <p:nvPicPr>
-          <p:cNvPr id="8" name="Image 7">
-            <a:extLst>
-              <a:ext uri="{FF2B5EF4-FFF2-40B4-BE49-F238E27FC236}">
-                <a16:creationId xmlns:a16="http://schemas.microsoft.com/office/drawing/2014/main" id="{886D9718-57EA-7F3C-6C63-041A5B141C15}"/>
-              </a:ext>
-            </a:extLst>
-          </p:cNvPr>
-          <p:cNvPicPr>
-            <a:picLocks noChangeAspect="1"/>
-          </p:cNvPicPr>
-          <p:nvPr/>
-        </p:nvPicPr>
-        <p:blipFill>
-          <a:blip r:embed="rId3"/>
-          <a:stretch>
-            <a:fillRect/>
-          </a:stretch>
-        </p:blipFill>
-        <p:spPr>
-          <a:xfrm>
-            <a:off x="7313210" y="3429000"/>
-            <a:ext cx="2486372" cy="1152686"/>
+            <a:off x="4001678" y="2026514"/>
+            <a:ext cx="4901588" cy="4576021"/>
           </a:xfrm>
           <a:prstGeom prst="rect">
             <a:avLst/>
@@ -3701,7 +3672,7 @@
     </p:spTree>
     <p:extLst>
       <p:ext uri="{BB962C8B-B14F-4D97-AF65-F5344CB8AC3E}">
-        <p14:creationId xmlns:p14="http://schemas.microsoft.com/office/powerpoint/2010/main" val="4259965272"/>
+        <p14:creationId xmlns:p14="http://schemas.microsoft.com/office/powerpoint/2010/main" val="2405409819"/>
       </p:ext>
     </p:extLst>
   </p:cSld>
@@ -3745,7 +3716,7 @@
           <p:cNvPr id="2" name="Titre 1">
             <a:extLst>
               <a:ext uri="{FF2B5EF4-FFF2-40B4-BE49-F238E27FC236}">
-                <a16:creationId xmlns:a16="http://schemas.microsoft.com/office/drawing/2014/main" id="{7E84A5D1-127D-1D31-4CE7-3C8C8455EB1D}"/>
+                <a16:creationId xmlns:a16="http://schemas.microsoft.com/office/drawing/2014/main" id="{B9CB8986-52A4-6385-C6A1-AD6933FFB237}"/>
               </a:ext>
             </a:extLst>
           </p:cNvPr>
@@ -3758,9 +3729,7 @@
         </p:nvSpPr>
         <p:spPr/>
         <p:txBody>
-          <a:bodyPr>
-            <a:normAutofit fontScale="90000"/>
-          </a:bodyPr>
+          <a:bodyPr/>
           <a:lstStyle/>
           <a:p>
             <a:pPr algn="ctr"/>
@@ -3773,155 +3742,7 @@
                 </a:solidFill>
                 <a:latin typeface="Copperplate Gothic Bold" panose="020E0705020206020404" pitchFamily="34" charset="0"/>
               </a:rPr>
-              <a:t>TROISIEME TÂCHE: </a:t>
-            </a:r>
-            <a:br>
-              <a:rPr lang="fr-FR" dirty="0">
-                <a:solidFill>
-                  <a:schemeClr val="accent1">
-                    <a:lumMod val="75000"/>
-                  </a:schemeClr>
-                </a:solidFill>
-                <a:latin typeface="Copperplate Gothic Bold" panose="020E0705020206020404" pitchFamily="34" charset="0"/>
-              </a:rPr>
-            </a:br>
-            <a:r>
-              <a:rPr lang="fr-FR" dirty="0">
-                <a:solidFill>
-                  <a:schemeClr val="accent1">
-                    <a:lumMod val="75000"/>
-                  </a:schemeClr>
-                </a:solidFill>
-                <a:latin typeface="Copperplate Gothic Bold" panose="020E0705020206020404" pitchFamily="34" charset="0"/>
-              </a:rPr>
-              <a:t>CRÉER UNE PAGE DE CONNEXION</a:t>
-            </a:r>
-            <a:endParaRPr lang="en-US" dirty="0"/>
-          </a:p>
-        </p:txBody>
-      </p:sp>
-      <p:pic>
-        <p:nvPicPr>
-          <p:cNvPr id="5" name="Image 4">
-            <a:extLst>
-              <a:ext uri="{FF2B5EF4-FFF2-40B4-BE49-F238E27FC236}">
-                <a16:creationId xmlns:a16="http://schemas.microsoft.com/office/drawing/2014/main" id="{81CC8018-7B10-938F-4C3D-BEABB27616E9}"/>
-              </a:ext>
-            </a:extLst>
-          </p:cNvPr>
-          <p:cNvPicPr>
-            <a:picLocks noChangeAspect="1"/>
-          </p:cNvPicPr>
-          <p:nvPr/>
-        </p:nvPicPr>
-        <p:blipFill>
-          <a:blip r:embed="rId2"/>
-          <a:stretch>
-            <a:fillRect/>
-          </a:stretch>
-        </p:blipFill>
-        <p:spPr>
-          <a:xfrm>
-            <a:off x="1081411" y="2998168"/>
-            <a:ext cx="4925434" cy="2997328"/>
-          </a:xfrm>
-          <a:prstGeom prst="rect">
-            <a:avLst/>
-          </a:prstGeom>
-        </p:spPr>
-      </p:pic>
-      <p:pic>
-        <p:nvPicPr>
-          <p:cNvPr id="8" name="Image 7">
-            <a:extLst>
-              <a:ext uri="{FF2B5EF4-FFF2-40B4-BE49-F238E27FC236}">
-                <a16:creationId xmlns:a16="http://schemas.microsoft.com/office/drawing/2014/main" id="{597CD8FE-D471-6CF4-0951-9E750D2D696B}"/>
-              </a:ext>
-            </a:extLst>
-          </p:cNvPr>
-          <p:cNvPicPr>
-            <a:picLocks noChangeAspect="1"/>
-          </p:cNvPicPr>
-          <p:nvPr/>
-        </p:nvPicPr>
-        <p:blipFill>
-          <a:blip r:embed="rId3"/>
-          <a:stretch>
-            <a:fillRect/>
-          </a:stretch>
-        </p:blipFill>
-        <p:spPr>
-          <a:xfrm>
-            <a:off x="7314887" y="2998168"/>
-            <a:ext cx="3067478" cy="2676899"/>
-          </a:xfrm>
-          <a:prstGeom prst="rect">
-            <a:avLst/>
-          </a:prstGeom>
-        </p:spPr>
-      </p:pic>
-    </p:spTree>
-    <p:extLst>
-      <p:ext uri="{BB962C8B-B14F-4D97-AF65-F5344CB8AC3E}">
-        <p14:creationId xmlns:p14="http://schemas.microsoft.com/office/powerpoint/2010/main" val="308260885"/>
-      </p:ext>
-    </p:extLst>
-  </p:cSld>
-  <p:clrMapOvr>
-    <a:masterClrMapping/>
-  </p:clrMapOvr>
-</p:sld>
-</file>
-
-<file path=ppt/slides/slide14.xml><?xml version="1.0" encoding="utf-8"?>
-<p:sld xmlns:a="http://schemas.openxmlformats.org/drawingml/2006/main" xmlns:r="http://schemas.openxmlformats.org/officeDocument/2006/relationships" xmlns:p="http://schemas.openxmlformats.org/presentationml/2006/main">
-  <p:cSld>
-    <p:spTree>
-      <p:nvGrpSpPr>
-        <p:cNvPr id="1" name=""/>
-        <p:cNvGrpSpPr/>
-        <p:nvPr/>
-      </p:nvGrpSpPr>
-      <p:grpSpPr>
-        <a:xfrm>
-          <a:off x="0" y="0"/>
-          <a:ext cx="0" cy="0"/>
-          <a:chOff x="0" y="0"/>
-          <a:chExt cx="0" cy="0"/>
-        </a:xfrm>
-      </p:grpSpPr>
-      <p:sp>
-        <p:nvSpPr>
-          <p:cNvPr id="2" name="Titre 1">
-            <a:extLst>
-              <a:ext uri="{FF2B5EF4-FFF2-40B4-BE49-F238E27FC236}">
-                <a16:creationId xmlns:a16="http://schemas.microsoft.com/office/drawing/2014/main" id="{B9CB8986-52A4-6385-C6A1-AD6933FFB237}"/>
-              </a:ext>
-            </a:extLst>
-          </p:cNvPr>
-          <p:cNvSpPr>
-            <a:spLocks noGrp="1"/>
-          </p:cNvSpPr>
-          <p:nvPr>
-            <p:ph type="title"/>
-          </p:nvPr>
-        </p:nvSpPr>
-        <p:spPr/>
-        <p:txBody>
-          <a:bodyPr/>
-          <a:lstStyle/>
-          <a:p>
-            <a:pPr algn="ctr"/>
-            <a:r>
-              <a:rPr lang="fr-FR" dirty="0">
-                <a:solidFill>
-                  <a:schemeClr val="accent1">
-                    <a:lumMod val="75000"/>
-                  </a:schemeClr>
-                </a:solidFill>
-                <a:latin typeface="Copperplate Gothic Bold" panose="020E0705020206020404" pitchFamily="34" charset="0"/>
-              </a:rPr>
-              <a:t>LA PAGE DE CONNEXION</a:t>
+              <a:t>LA PARTIE CODE PC</a:t>
             </a:r>
             <a:endParaRPr lang="en-US" dirty="0">
               <a:solidFill>
@@ -3996,7 +3817,7 @@
                 <a:ea typeface="+mn-ea"/>
                 <a:cs typeface="+mn-cs"/>
               </a:rPr>
-              <a:t>I/ Le HTML</a:t>
+              <a:t>II/ Le javascript</a:t>
             </a:r>
             <a:endParaRPr kumimoji="0" lang="en-US" sz="2400" b="1" i="0" u="sng" strike="noStrike" kern="1200" cap="none" spc="0" normalizeH="0" baseline="0" noProof="0" dirty="0">
               <a:ln>
@@ -4019,10 +3840,10 @@
       </p:sp>
       <p:pic>
         <p:nvPicPr>
-          <p:cNvPr id="9" name="Image 8">
-            <a:extLst>
-              <a:ext uri="{FF2B5EF4-FFF2-40B4-BE49-F238E27FC236}">
-                <a16:creationId xmlns:a16="http://schemas.microsoft.com/office/drawing/2014/main" id="{E65A7D41-1558-AA8C-8FFD-C37D2F8B6779}"/>
+          <p:cNvPr id="4" name="Image 3">
+            <a:extLst>
+              <a:ext uri="{FF2B5EF4-FFF2-40B4-BE49-F238E27FC236}">
+                <a16:creationId xmlns:a16="http://schemas.microsoft.com/office/drawing/2014/main" id="{4159EAF7-BF2A-6088-7B29-4060DEEAEA67}"/>
               </a:ext>
             </a:extLst>
           </p:cNvPr>
@@ -4039,8 +3860,38 @@
         </p:blipFill>
         <p:spPr>
           <a:xfrm>
-            <a:off x="2818942" y="2724435"/>
-            <a:ext cx="6554115" cy="2238687"/>
+            <a:off x="838200" y="2562772"/>
+            <a:ext cx="5630061" cy="3410426"/>
+          </a:xfrm>
+          <a:prstGeom prst="rect">
+            <a:avLst/>
+          </a:prstGeom>
+        </p:spPr>
+      </p:pic>
+      <p:pic>
+        <p:nvPicPr>
+          <p:cNvPr id="8" name="Image 7">
+            <a:extLst>
+              <a:ext uri="{FF2B5EF4-FFF2-40B4-BE49-F238E27FC236}">
+                <a16:creationId xmlns:a16="http://schemas.microsoft.com/office/drawing/2014/main" id="{886D9718-57EA-7F3C-6C63-041A5B141C15}"/>
+              </a:ext>
+            </a:extLst>
+          </p:cNvPr>
+          <p:cNvPicPr>
+            <a:picLocks noChangeAspect="1"/>
+          </p:cNvPicPr>
+          <p:nvPr/>
+        </p:nvPicPr>
+        <p:blipFill>
+          <a:blip r:embed="rId3"/>
+          <a:stretch>
+            <a:fillRect/>
+          </a:stretch>
+        </p:blipFill>
+        <p:spPr>
+          <a:xfrm>
+            <a:off x="7313210" y="3429000"/>
+            <a:ext cx="2486372" cy="1152686"/>
           </a:xfrm>
           <a:prstGeom prst="rect">
             <a:avLst/>
@@ -4050,7 +3901,7 @@
     </p:spTree>
     <p:extLst>
       <p:ext uri="{BB962C8B-B14F-4D97-AF65-F5344CB8AC3E}">
-        <p14:creationId xmlns:p14="http://schemas.microsoft.com/office/powerpoint/2010/main" val="2403373451"/>
+        <p14:creationId xmlns:p14="http://schemas.microsoft.com/office/powerpoint/2010/main" val="4259965272"/>
       </p:ext>
     </p:extLst>
   </p:cSld>
@@ -4072,6 +3923,156 @@
 </p:sld>
 </file>
 
+<file path=ppt/slides/slide14.xml><?xml version="1.0" encoding="utf-8"?>
+<p:sld xmlns:a="http://schemas.openxmlformats.org/drawingml/2006/main" xmlns:r="http://schemas.openxmlformats.org/officeDocument/2006/relationships" xmlns:p="http://schemas.openxmlformats.org/presentationml/2006/main">
+  <p:cSld>
+    <p:spTree>
+      <p:nvGrpSpPr>
+        <p:cNvPr id="1" name=""/>
+        <p:cNvGrpSpPr/>
+        <p:nvPr/>
+      </p:nvGrpSpPr>
+      <p:grpSpPr>
+        <a:xfrm>
+          <a:off x="0" y="0"/>
+          <a:ext cx="0" cy="0"/>
+          <a:chOff x="0" y="0"/>
+          <a:chExt cx="0" cy="0"/>
+        </a:xfrm>
+      </p:grpSpPr>
+      <p:sp>
+        <p:nvSpPr>
+          <p:cNvPr id="2" name="Titre 1">
+            <a:extLst>
+              <a:ext uri="{FF2B5EF4-FFF2-40B4-BE49-F238E27FC236}">
+                <a16:creationId xmlns:a16="http://schemas.microsoft.com/office/drawing/2014/main" id="{7E84A5D1-127D-1D31-4CE7-3C8C8455EB1D}"/>
+              </a:ext>
+            </a:extLst>
+          </p:cNvPr>
+          <p:cNvSpPr>
+            <a:spLocks noGrp="1"/>
+          </p:cNvSpPr>
+          <p:nvPr>
+            <p:ph type="title"/>
+          </p:nvPr>
+        </p:nvSpPr>
+        <p:spPr/>
+        <p:txBody>
+          <a:bodyPr>
+            <a:normAutofit fontScale="90000"/>
+          </a:bodyPr>
+          <a:lstStyle/>
+          <a:p>
+            <a:pPr algn="ctr"/>
+            <a:r>
+              <a:rPr lang="fr-FR" dirty="0">
+                <a:solidFill>
+                  <a:schemeClr val="accent1">
+                    <a:lumMod val="75000"/>
+                  </a:schemeClr>
+                </a:solidFill>
+                <a:latin typeface="Copperplate Gothic Bold" panose="020E0705020206020404" pitchFamily="34" charset="0"/>
+              </a:rPr>
+              <a:t>TROISIEME TÂCHE: </a:t>
+            </a:r>
+            <a:br>
+              <a:rPr lang="fr-FR" dirty="0">
+                <a:solidFill>
+                  <a:schemeClr val="accent1">
+                    <a:lumMod val="75000"/>
+                  </a:schemeClr>
+                </a:solidFill>
+                <a:latin typeface="Copperplate Gothic Bold" panose="020E0705020206020404" pitchFamily="34" charset="0"/>
+              </a:rPr>
+            </a:br>
+            <a:r>
+              <a:rPr lang="fr-FR" dirty="0">
+                <a:solidFill>
+                  <a:schemeClr val="accent1">
+                    <a:lumMod val="75000"/>
+                  </a:schemeClr>
+                </a:solidFill>
+                <a:latin typeface="Copperplate Gothic Bold" panose="020E0705020206020404" pitchFamily="34" charset="0"/>
+              </a:rPr>
+              <a:t>CRÉER UNE PAGE DE CONNEXION</a:t>
+            </a:r>
+            <a:endParaRPr lang="en-US" dirty="0"/>
+          </a:p>
+        </p:txBody>
+      </p:sp>
+      <p:pic>
+        <p:nvPicPr>
+          <p:cNvPr id="5" name="Image 4">
+            <a:extLst>
+              <a:ext uri="{FF2B5EF4-FFF2-40B4-BE49-F238E27FC236}">
+                <a16:creationId xmlns:a16="http://schemas.microsoft.com/office/drawing/2014/main" id="{81CC8018-7B10-938F-4C3D-BEABB27616E9}"/>
+              </a:ext>
+            </a:extLst>
+          </p:cNvPr>
+          <p:cNvPicPr>
+            <a:picLocks noChangeAspect="1"/>
+          </p:cNvPicPr>
+          <p:nvPr/>
+        </p:nvPicPr>
+        <p:blipFill>
+          <a:blip r:embed="rId2"/>
+          <a:stretch>
+            <a:fillRect/>
+          </a:stretch>
+        </p:blipFill>
+        <p:spPr>
+          <a:xfrm>
+            <a:off x="1081411" y="2998168"/>
+            <a:ext cx="4925434" cy="2997328"/>
+          </a:xfrm>
+          <a:prstGeom prst="rect">
+            <a:avLst/>
+          </a:prstGeom>
+        </p:spPr>
+      </p:pic>
+      <p:pic>
+        <p:nvPicPr>
+          <p:cNvPr id="8" name="Image 7">
+            <a:extLst>
+              <a:ext uri="{FF2B5EF4-FFF2-40B4-BE49-F238E27FC236}">
+                <a16:creationId xmlns:a16="http://schemas.microsoft.com/office/drawing/2014/main" id="{597CD8FE-D471-6CF4-0951-9E750D2D696B}"/>
+              </a:ext>
+            </a:extLst>
+          </p:cNvPr>
+          <p:cNvPicPr>
+            <a:picLocks noChangeAspect="1"/>
+          </p:cNvPicPr>
+          <p:nvPr/>
+        </p:nvPicPr>
+        <p:blipFill>
+          <a:blip r:embed="rId3"/>
+          <a:stretch>
+            <a:fillRect/>
+          </a:stretch>
+        </p:blipFill>
+        <p:spPr>
+          <a:xfrm>
+            <a:off x="7314887" y="2998168"/>
+            <a:ext cx="3067478" cy="2676899"/>
+          </a:xfrm>
+          <a:prstGeom prst="rect">
+            <a:avLst/>
+          </a:prstGeom>
+        </p:spPr>
+      </p:pic>
+    </p:spTree>
+    <p:extLst>
+      <p:ext uri="{BB962C8B-B14F-4D97-AF65-F5344CB8AC3E}">
+        <p14:creationId xmlns:p14="http://schemas.microsoft.com/office/powerpoint/2010/main" val="308260885"/>
+      </p:ext>
+    </p:extLst>
+  </p:cSld>
+  <p:clrMapOvr>
+    <a:masterClrMapping/>
+  </p:clrMapOvr>
+</p:sld>
+</file>
+
 <file path=ppt/slides/slide15.xml><?xml version="1.0" encoding="utf-8"?>
 <p:sld xmlns:a="http://schemas.openxmlformats.org/drawingml/2006/main" xmlns:r="http://schemas.openxmlformats.org/officeDocument/2006/relationships" xmlns:p="http://schemas.openxmlformats.org/presentationml/2006/main">
   <p:cSld>
@@ -4195,7 +4196,7 @@
                 <a:ea typeface="+mn-ea"/>
                 <a:cs typeface="+mn-cs"/>
               </a:rPr>
-              <a:t>II/ Le javascript</a:t>
+              <a:t>I/ Le HTML</a:t>
             </a:r>
             <a:endParaRPr kumimoji="0" lang="en-US" sz="2400" b="1" i="0" u="sng" strike="noStrike" kern="1200" cap="none" spc="0" normalizeH="0" baseline="0" noProof="0" dirty="0">
               <a:ln>
@@ -4218,10 +4219,10 @@
       </p:sp>
       <p:pic>
         <p:nvPicPr>
-          <p:cNvPr id="4" name="Image 3">
-            <a:extLst>
-              <a:ext uri="{FF2B5EF4-FFF2-40B4-BE49-F238E27FC236}">
-                <a16:creationId xmlns:a16="http://schemas.microsoft.com/office/drawing/2014/main" id="{23C42824-DAD1-5DD0-90C7-858222BE659D}"/>
+          <p:cNvPr id="9" name="Image 8">
+            <a:extLst>
+              <a:ext uri="{FF2B5EF4-FFF2-40B4-BE49-F238E27FC236}">
+                <a16:creationId xmlns:a16="http://schemas.microsoft.com/office/drawing/2014/main" id="{E65A7D41-1558-AA8C-8FFD-C37D2F8B6779}"/>
               </a:ext>
             </a:extLst>
           </p:cNvPr>
@@ -4238,38 +4239,8 @@
         </p:blipFill>
         <p:spPr>
           <a:xfrm>
-            <a:off x="163810" y="2596442"/>
-            <a:ext cx="6702044" cy="2686775"/>
-          </a:xfrm>
-          <a:prstGeom prst="rect">
-            <a:avLst/>
-          </a:prstGeom>
-        </p:spPr>
-      </p:pic>
-      <p:pic>
-        <p:nvPicPr>
-          <p:cNvPr id="8" name="Image 7">
-            <a:extLst>
-              <a:ext uri="{FF2B5EF4-FFF2-40B4-BE49-F238E27FC236}">
-                <a16:creationId xmlns:a16="http://schemas.microsoft.com/office/drawing/2014/main" id="{B05D8EA7-1F9D-81FA-1568-9A9048623F54}"/>
-              </a:ext>
-            </a:extLst>
-          </p:cNvPr>
-          <p:cNvPicPr>
-            <a:picLocks noChangeAspect="1"/>
-          </p:cNvPicPr>
-          <p:nvPr/>
-        </p:nvPicPr>
-        <p:blipFill>
-          <a:blip r:embed="rId3"/>
-          <a:stretch>
-            <a:fillRect/>
-          </a:stretch>
-        </p:blipFill>
-        <p:spPr>
-          <a:xfrm>
-            <a:off x="6952392" y="2712350"/>
-            <a:ext cx="5075798" cy="2454961"/>
+            <a:off x="2818942" y="2724435"/>
+            <a:ext cx="6554115" cy="2238687"/>
           </a:xfrm>
           <a:prstGeom prst="rect">
             <a:avLst/>
@@ -4279,7 +4250,7 @@
     </p:spTree>
     <p:extLst>
       <p:ext uri="{BB962C8B-B14F-4D97-AF65-F5344CB8AC3E}">
-        <p14:creationId xmlns:p14="http://schemas.microsoft.com/office/powerpoint/2010/main" val="3061197592"/>
+        <p14:creationId xmlns:p14="http://schemas.microsoft.com/office/powerpoint/2010/main" val="2403373451"/>
       </p:ext>
     </p:extLst>
   </p:cSld>
@@ -4450,7 +4421,7 @@
           <p:cNvPr id="4" name="Image 3">
             <a:extLst>
               <a:ext uri="{FF2B5EF4-FFF2-40B4-BE49-F238E27FC236}">
-                <a16:creationId xmlns:a16="http://schemas.microsoft.com/office/drawing/2014/main" id="{4BF7A019-870F-8506-BE43-F630F504B6C8}"/>
+                <a16:creationId xmlns:a16="http://schemas.microsoft.com/office/drawing/2014/main" id="{23C42824-DAD1-5DD0-90C7-858222BE659D}"/>
               </a:ext>
             </a:extLst>
           </p:cNvPr>
@@ -4467,8 +4438,38 @@
         </p:blipFill>
         <p:spPr>
           <a:xfrm>
-            <a:off x="3064709" y="2225895"/>
-            <a:ext cx="6494072" cy="4269251"/>
+            <a:off x="163810" y="2596442"/>
+            <a:ext cx="6702044" cy="2686775"/>
+          </a:xfrm>
+          <a:prstGeom prst="rect">
+            <a:avLst/>
+          </a:prstGeom>
+        </p:spPr>
+      </p:pic>
+      <p:pic>
+        <p:nvPicPr>
+          <p:cNvPr id="8" name="Image 7">
+            <a:extLst>
+              <a:ext uri="{FF2B5EF4-FFF2-40B4-BE49-F238E27FC236}">
+                <a16:creationId xmlns:a16="http://schemas.microsoft.com/office/drawing/2014/main" id="{B05D8EA7-1F9D-81FA-1568-9A9048623F54}"/>
+              </a:ext>
+            </a:extLst>
+          </p:cNvPr>
+          <p:cNvPicPr>
+            <a:picLocks noChangeAspect="1"/>
+          </p:cNvPicPr>
+          <p:nvPr/>
+        </p:nvPicPr>
+        <p:blipFill>
+          <a:blip r:embed="rId3"/>
+          <a:stretch>
+            <a:fillRect/>
+          </a:stretch>
+        </p:blipFill>
+        <p:spPr>
+          <a:xfrm>
+            <a:off x="6952392" y="2712350"/>
+            <a:ext cx="5075798" cy="2454961"/>
           </a:xfrm>
           <a:prstGeom prst="rect">
             <a:avLst/>
@@ -4478,7 +4479,7 @@
     </p:spTree>
     <p:extLst>
       <p:ext uri="{BB962C8B-B14F-4D97-AF65-F5344CB8AC3E}">
-        <p14:creationId xmlns:p14="http://schemas.microsoft.com/office/powerpoint/2010/main" val="2500763863"/>
+        <p14:creationId xmlns:p14="http://schemas.microsoft.com/office/powerpoint/2010/main" val="3061197592"/>
       </p:ext>
     </p:extLst>
   </p:cSld>
@@ -4522,7 +4523,7 @@
           <p:cNvPr id="2" name="Titre 1">
             <a:extLst>
               <a:ext uri="{FF2B5EF4-FFF2-40B4-BE49-F238E27FC236}">
-                <a16:creationId xmlns:a16="http://schemas.microsoft.com/office/drawing/2014/main" id="{7E84A5D1-127D-1D31-4CE7-3C8C8455EB1D}"/>
+                <a16:creationId xmlns:a16="http://schemas.microsoft.com/office/drawing/2014/main" id="{B9CB8986-52A4-6385-C6A1-AD6933FFB237}"/>
               </a:ext>
             </a:extLst>
           </p:cNvPr>
@@ -4535,9 +4536,7 @@
         </p:nvSpPr>
         <p:spPr/>
         <p:txBody>
-          <a:bodyPr>
-            <a:normAutofit fontScale="90000"/>
-          </a:bodyPr>
+          <a:bodyPr/>
           <a:lstStyle/>
           <a:p>
             <a:pPr algn="ctr"/>
@@ -4550,123 +4549,19 @@
                 </a:solidFill>
                 <a:latin typeface="Copperplate Gothic Bold" panose="020E0705020206020404" pitchFamily="34" charset="0"/>
               </a:rPr>
-              <a:t>QUATRIEME TÂCHE: </a:t>
-            </a:r>
-            <a:br>
-              <a:rPr lang="fr-FR" dirty="0">
-                <a:solidFill>
-                  <a:schemeClr val="accent1">
-                    <a:lumMod val="75000"/>
-                  </a:schemeClr>
-                </a:solidFill>
-                <a:latin typeface="Copperplate Gothic Bold" panose="020E0705020206020404" pitchFamily="34" charset="0"/>
-              </a:rPr>
-            </a:br>
-            <a:r>
-              <a:rPr lang="fr-FR" dirty="0">
-                <a:solidFill>
-                  <a:schemeClr val="accent1">
-                    <a:lumMod val="75000"/>
-                  </a:schemeClr>
-                </a:solidFill>
-                <a:latin typeface="Copperplate Gothic Bold" panose="020E0705020206020404" pitchFamily="34" charset="0"/>
-              </a:rPr>
-              <a:t>LA MODALE DE SUPPRESSION DE PROJET</a:t>
-            </a:r>
-            <a:endParaRPr lang="en-US" dirty="0"/>
-          </a:p>
-        </p:txBody>
-      </p:sp>
-      <p:pic>
-        <p:nvPicPr>
-          <p:cNvPr id="4" name="Image 3">
-            <a:extLst>
-              <a:ext uri="{FF2B5EF4-FFF2-40B4-BE49-F238E27FC236}">
-                <a16:creationId xmlns:a16="http://schemas.microsoft.com/office/drawing/2014/main" id="{C4A59816-887B-F007-3C33-E28C3452B84A}"/>
-              </a:ext>
-            </a:extLst>
-          </p:cNvPr>
-          <p:cNvPicPr>
-            <a:picLocks noChangeAspect="1"/>
-          </p:cNvPicPr>
-          <p:nvPr/>
-        </p:nvPicPr>
-        <p:blipFill>
-          <a:blip r:embed="rId2"/>
-          <a:stretch>
-            <a:fillRect/>
-          </a:stretch>
-        </p:blipFill>
-        <p:spPr>
-          <a:xfrm>
-            <a:off x="708021" y="2859643"/>
-            <a:ext cx="5693197" cy="2953947"/>
-          </a:xfrm>
-          <a:prstGeom prst="rect">
-            <a:avLst/>
-          </a:prstGeom>
-        </p:spPr>
-      </p:pic>
-      <p:pic>
-        <p:nvPicPr>
-          <p:cNvPr id="7" name="Image 6">
-            <a:extLst>
-              <a:ext uri="{FF2B5EF4-FFF2-40B4-BE49-F238E27FC236}">
-                <a16:creationId xmlns:a16="http://schemas.microsoft.com/office/drawing/2014/main" id="{EB174E89-8B5B-881F-7AA7-21C19C296F9B}"/>
-              </a:ext>
-            </a:extLst>
-          </p:cNvPr>
-          <p:cNvPicPr>
-            <a:picLocks noChangeAspect="1"/>
-          </p:cNvPicPr>
-          <p:nvPr/>
-        </p:nvPicPr>
-        <p:blipFill>
-          <a:blip r:embed="rId3"/>
-          <a:stretch>
-            <a:fillRect/>
-          </a:stretch>
-        </p:blipFill>
-        <p:spPr>
-          <a:xfrm>
-            <a:off x="7172548" y="2102177"/>
-            <a:ext cx="4181252" cy="4284748"/>
-          </a:xfrm>
-          <a:prstGeom prst="rect">
-            <a:avLst/>
-          </a:prstGeom>
-        </p:spPr>
-      </p:pic>
-    </p:spTree>
-    <p:extLst>
-      <p:ext uri="{BB962C8B-B14F-4D97-AF65-F5344CB8AC3E}">
-        <p14:creationId xmlns:p14="http://schemas.microsoft.com/office/powerpoint/2010/main" val="731950800"/>
-      </p:ext>
-    </p:extLst>
-  </p:cSld>
-  <p:clrMapOvr>
-    <a:masterClrMapping/>
-  </p:clrMapOvr>
-</p:sld>
-</file>
-
-<file path=ppt/slides/slide18.xml><?xml version="1.0" encoding="utf-8"?>
-<p:sld xmlns:a="http://schemas.openxmlformats.org/drawingml/2006/main" xmlns:r="http://schemas.openxmlformats.org/officeDocument/2006/relationships" xmlns:p="http://schemas.openxmlformats.org/presentationml/2006/main">
-  <p:cSld>
-    <p:spTree>
-      <p:nvGrpSpPr>
-        <p:cNvPr id="1" name=""/>
-        <p:cNvGrpSpPr/>
-        <p:nvPr/>
-      </p:nvGrpSpPr>
-      <p:grpSpPr>
-        <a:xfrm>
-          <a:off x="0" y="0"/>
-          <a:ext cx="0" cy="0"/>
-          <a:chOff x="0" y="0"/>
-          <a:chExt cx="0" cy="0"/>
-        </a:xfrm>
-      </p:grpSpPr>
+              <a:t>LA PAGE DE CONNEXION</a:t>
+            </a:r>
+            <a:endParaRPr lang="en-US" dirty="0">
+              <a:solidFill>
+                <a:schemeClr val="accent1">
+                  <a:lumMod val="75000"/>
+                </a:schemeClr>
+              </a:solidFill>
+              <a:latin typeface="Copperplate Gothic Bold" panose="020E0705020206020404" pitchFamily="34" charset="0"/>
+            </a:endParaRPr>
+          </a:p>
+        </p:txBody>
+      </p:sp>
       <p:sp>
         <p:nvSpPr>
           <p:cNvPr id="5" name="ZoneTexte 4">
@@ -4729,7 +4624,7 @@
                 <a:ea typeface="+mn-ea"/>
                 <a:cs typeface="+mn-cs"/>
               </a:rPr>
-              <a:t>I/ La fenêtre modale partie HTML</a:t>
+              <a:t>II/ Le javascript</a:t>
             </a:r>
             <a:endParaRPr kumimoji="0" lang="en-US" sz="2400" b="1" i="0" u="sng" strike="noStrike" kern="1200" cap="none" spc="0" normalizeH="0" baseline="0" noProof="0" dirty="0">
               <a:ln>
@@ -4750,61 +4645,12 @@
           </a:p>
         </p:txBody>
       </p:sp>
-      <p:sp>
-        <p:nvSpPr>
-          <p:cNvPr id="8" name="Titre 1">
-            <a:extLst>
-              <a:ext uri="{FF2B5EF4-FFF2-40B4-BE49-F238E27FC236}">
-                <a16:creationId xmlns:a16="http://schemas.microsoft.com/office/drawing/2014/main" id="{C7CE8BF2-ECFD-0983-566E-BAC4213C32C1}"/>
-              </a:ext>
-            </a:extLst>
-          </p:cNvPr>
-          <p:cNvSpPr>
-            <a:spLocks noGrp="1"/>
-          </p:cNvSpPr>
-          <p:nvPr>
-            <p:ph type="title"/>
-          </p:nvPr>
-        </p:nvSpPr>
-        <p:spPr>
-          <a:xfrm>
-            <a:off x="838200" y="365125"/>
-            <a:ext cx="10515600" cy="1325563"/>
-          </a:xfrm>
-        </p:spPr>
-        <p:txBody>
-          <a:bodyPr/>
-          <a:lstStyle/>
-          <a:p>
-            <a:pPr algn="ctr"/>
-            <a:r>
-              <a:rPr lang="fr-FR" dirty="0">
-                <a:solidFill>
-                  <a:schemeClr val="accent1">
-                    <a:lumMod val="75000"/>
-                  </a:schemeClr>
-                </a:solidFill>
-                <a:latin typeface="Copperplate Gothic Bold" panose="020E0705020206020404" pitchFamily="34" charset="0"/>
-              </a:rPr>
-              <a:t>LA MODALE DE SUPRESSION DE PROJET</a:t>
-            </a:r>
-            <a:endParaRPr lang="en-US" dirty="0">
-              <a:solidFill>
-                <a:schemeClr val="accent1">
-                  <a:lumMod val="75000"/>
-                </a:schemeClr>
-              </a:solidFill>
-              <a:latin typeface="Copperplate Gothic Bold" panose="020E0705020206020404" pitchFamily="34" charset="0"/>
-            </a:endParaRPr>
-          </a:p>
-        </p:txBody>
-      </p:sp>
       <p:pic>
         <p:nvPicPr>
-          <p:cNvPr id="11" name="Image 10">
-            <a:extLst>
-              <a:ext uri="{FF2B5EF4-FFF2-40B4-BE49-F238E27FC236}">
-                <a16:creationId xmlns:a16="http://schemas.microsoft.com/office/drawing/2014/main" id="{2BDAD111-3758-48CC-10B5-750CF3B8ED04}"/>
+          <p:cNvPr id="4" name="Image 3">
+            <a:extLst>
+              <a:ext uri="{FF2B5EF4-FFF2-40B4-BE49-F238E27FC236}">
+                <a16:creationId xmlns:a16="http://schemas.microsoft.com/office/drawing/2014/main" id="{4BF7A019-870F-8506-BE43-F630F504B6C8}"/>
               </a:ext>
             </a:extLst>
           </p:cNvPr>
@@ -4821,8 +4667,8 @@
         </p:blipFill>
         <p:spPr>
           <a:xfrm>
-            <a:off x="1204230" y="2356762"/>
-            <a:ext cx="9783540" cy="4048690"/>
+            <a:off x="3064709" y="2225895"/>
+            <a:ext cx="6494072" cy="4269251"/>
           </a:xfrm>
           <a:prstGeom prst="rect">
             <a:avLst/>
@@ -4832,7 +4678,7 @@
     </p:spTree>
     <p:extLst>
       <p:ext uri="{BB962C8B-B14F-4D97-AF65-F5344CB8AC3E}">
-        <p14:creationId xmlns:p14="http://schemas.microsoft.com/office/powerpoint/2010/main" val="3612471308"/>
+        <p14:creationId xmlns:p14="http://schemas.microsoft.com/office/powerpoint/2010/main" val="2500763863"/>
       </p:ext>
     </p:extLst>
   </p:cSld>
@@ -4854,6 +4700,156 @@
 </p:sld>
 </file>
 
+<file path=ppt/slides/slide18.xml><?xml version="1.0" encoding="utf-8"?>
+<p:sld xmlns:a="http://schemas.openxmlformats.org/drawingml/2006/main" xmlns:r="http://schemas.openxmlformats.org/officeDocument/2006/relationships" xmlns:p="http://schemas.openxmlformats.org/presentationml/2006/main">
+  <p:cSld>
+    <p:spTree>
+      <p:nvGrpSpPr>
+        <p:cNvPr id="1" name=""/>
+        <p:cNvGrpSpPr/>
+        <p:nvPr/>
+      </p:nvGrpSpPr>
+      <p:grpSpPr>
+        <a:xfrm>
+          <a:off x="0" y="0"/>
+          <a:ext cx="0" cy="0"/>
+          <a:chOff x="0" y="0"/>
+          <a:chExt cx="0" cy="0"/>
+        </a:xfrm>
+      </p:grpSpPr>
+      <p:sp>
+        <p:nvSpPr>
+          <p:cNvPr id="2" name="Titre 1">
+            <a:extLst>
+              <a:ext uri="{FF2B5EF4-FFF2-40B4-BE49-F238E27FC236}">
+                <a16:creationId xmlns:a16="http://schemas.microsoft.com/office/drawing/2014/main" id="{7E84A5D1-127D-1D31-4CE7-3C8C8455EB1D}"/>
+              </a:ext>
+            </a:extLst>
+          </p:cNvPr>
+          <p:cNvSpPr>
+            <a:spLocks noGrp="1"/>
+          </p:cNvSpPr>
+          <p:nvPr>
+            <p:ph type="title"/>
+          </p:nvPr>
+        </p:nvSpPr>
+        <p:spPr/>
+        <p:txBody>
+          <a:bodyPr>
+            <a:normAutofit fontScale="90000"/>
+          </a:bodyPr>
+          <a:lstStyle/>
+          <a:p>
+            <a:pPr algn="ctr"/>
+            <a:r>
+              <a:rPr lang="fr-FR" dirty="0">
+                <a:solidFill>
+                  <a:schemeClr val="accent1">
+                    <a:lumMod val="75000"/>
+                  </a:schemeClr>
+                </a:solidFill>
+                <a:latin typeface="Copperplate Gothic Bold" panose="020E0705020206020404" pitchFamily="34" charset="0"/>
+              </a:rPr>
+              <a:t>QUATRIEME TÂCHE: </a:t>
+            </a:r>
+            <a:br>
+              <a:rPr lang="fr-FR" dirty="0">
+                <a:solidFill>
+                  <a:schemeClr val="accent1">
+                    <a:lumMod val="75000"/>
+                  </a:schemeClr>
+                </a:solidFill>
+                <a:latin typeface="Copperplate Gothic Bold" panose="020E0705020206020404" pitchFamily="34" charset="0"/>
+              </a:rPr>
+            </a:br>
+            <a:r>
+              <a:rPr lang="fr-FR" dirty="0">
+                <a:solidFill>
+                  <a:schemeClr val="accent1">
+                    <a:lumMod val="75000"/>
+                  </a:schemeClr>
+                </a:solidFill>
+                <a:latin typeface="Copperplate Gothic Bold" panose="020E0705020206020404" pitchFamily="34" charset="0"/>
+              </a:rPr>
+              <a:t>LA MODALE DE SUPPRESSION DE PROJET</a:t>
+            </a:r>
+            <a:endParaRPr lang="en-US" dirty="0"/>
+          </a:p>
+        </p:txBody>
+      </p:sp>
+      <p:pic>
+        <p:nvPicPr>
+          <p:cNvPr id="4" name="Image 3">
+            <a:extLst>
+              <a:ext uri="{FF2B5EF4-FFF2-40B4-BE49-F238E27FC236}">
+                <a16:creationId xmlns:a16="http://schemas.microsoft.com/office/drawing/2014/main" id="{C4A59816-887B-F007-3C33-E28C3452B84A}"/>
+              </a:ext>
+            </a:extLst>
+          </p:cNvPr>
+          <p:cNvPicPr>
+            <a:picLocks noChangeAspect="1"/>
+          </p:cNvPicPr>
+          <p:nvPr/>
+        </p:nvPicPr>
+        <p:blipFill>
+          <a:blip r:embed="rId2"/>
+          <a:stretch>
+            <a:fillRect/>
+          </a:stretch>
+        </p:blipFill>
+        <p:spPr>
+          <a:xfrm>
+            <a:off x="708021" y="2859643"/>
+            <a:ext cx="5693197" cy="2953947"/>
+          </a:xfrm>
+          <a:prstGeom prst="rect">
+            <a:avLst/>
+          </a:prstGeom>
+        </p:spPr>
+      </p:pic>
+      <p:pic>
+        <p:nvPicPr>
+          <p:cNvPr id="7" name="Image 6">
+            <a:extLst>
+              <a:ext uri="{FF2B5EF4-FFF2-40B4-BE49-F238E27FC236}">
+                <a16:creationId xmlns:a16="http://schemas.microsoft.com/office/drawing/2014/main" id="{EB174E89-8B5B-881F-7AA7-21C19C296F9B}"/>
+              </a:ext>
+            </a:extLst>
+          </p:cNvPr>
+          <p:cNvPicPr>
+            <a:picLocks noChangeAspect="1"/>
+          </p:cNvPicPr>
+          <p:nvPr/>
+        </p:nvPicPr>
+        <p:blipFill>
+          <a:blip r:embed="rId3"/>
+          <a:stretch>
+            <a:fillRect/>
+          </a:stretch>
+        </p:blipFill>
+        <p:spPr>
+          <a:xfrm>
+            <a:off x="7172548" y="2102177"/>
+            <a:ext cx="4181252" cy="4284748"/>
+          </a:xfrm>
+          <a:prstGeom prst="rect">
+            <a:avLst/>
+          </a:prstGeom>
+        </p:spPr>
+      </p:pic>
+    </p:spTree>
+    <p:extLst>
+      <p:ext uri="{BB962C8B-B14F-4D97-AF65-F5344CB8AC3E}">
+        <p14:creationId xmlns:p14="http://schemas.microsoft.com/office/powerpoint/2010/main" val="731950800"/>
+      </p:ext>
+    </p:extLst>
+  </p:cSld>
+  <p:clrMapOvr>
+    <a:masterClrMapping/>
+  </p:clrMapOvr>
+</p:sld>
+</file>
+
 <file path=ppt/slides/slide19.xml><?xml version="1.0" encoding="utf-8"?>
 <p:sld xmlns:a="http://schemas.openxmlformats.org/drawingml/2006/main" xmlns:r="http://schemas.openxmlformats.org/officeDocument/2006/relationships" xmlns:p="http://schemas.openxmlformats.org/presentationml/2006/main">
   <p:cSld>
@@ -4933,7 +4929,7 @@
                 <a:ea typeface="+mn-ea"/>
                 <a:cs typeface="+mn-cs"/>
               </a:rPr>
-              <a:t>II/ La fenêtre modale partie CSS</a:t>
+              <a:t>I/ La fenêtre modale partie HTML</a:t>
             </a:r>
             <a:endParaRPr kumimoji="0" lang="en-US" sz="2400" b="1" i="0" u="sng" strike="noStrike" kern="1200" cap="none" spc="0" normalizeH="0" baseline="0" noProof="0" dirty="0">
               <a:ln>
@@ -5005,10 +5001,10 @@
       </p:sp>
       <p:pic>
         <p:nvPicPr>
-          <p:cNvPr id="3" name="Image 2">
-            <a:extLst>
-              <a:ext uri="{FF2B5EF4-FFF2-40B4-BE49-F238E27FC236}">
-                <a16:creationId xmlns:a16="http://schemas.microsoft.com/office/drawing/2014/main" id="{84483699-45F8-7E46-2675-C8D52DC63AAC}"/>
+          <p:cNvPr id="11" name="Image 10">
+            <a:extLst>
+              <a:ext uri="{FF2B5EF4-FFF2-40B4-BE49-F238E27FC236}">
+                <a16:creationId xmlns:a16="http://schemas.microsoft.com/office/drawing/2014/main" id="{2BDAD111-3758-48CC-10B5-750CF3B8ED04}"/>
               </a:ext>
             </a:extLst>
           </p:cNvPr>
@@ -5025,8 +5021,8 @@
         </p:blipFill>
         <p:spPr>
           <a:xfrm>
-            <a:off x="4946156" y="2150024"/>
-            <a:ext cx="1614900" cy="4519439"/>
+            <a:off x="1204230" y="2356762"/>
+            <a:ext cx="9783540" cy="4048690"/>
           </a:xfrm>
           <a:prstGeom prst="rect">
             <a:avLst/>
@@ -5036,7 +5032,7 @@
     </p:spTree>
     <p:extLst>
       <p:ext uri="{BB962C8B-B14F-4D97-AF65-F5344CB8AC3E}">
-        <p14:creationId xmlns:p14="http://schemas.microsoft.com/office/powerpoint/2010/main" val="677539135"/>
+        <p14:creationId xmlns:p14="http://schemas.microsoft.com/office/powerpoint/2010/main" val="3612471308"/>
       </p:ext>
     </p:extLst>
   </p:cSld>
@@ -5368,7 +5364,7 @@
                 <a:ea typeface="+mn-ea"/>
                 <a:cs typeface="+mn-cs"/>
               </a:rPr>
-              <a:t>II/ La fenêtre modale partie javascript</a:t>
+              <a:t>II/ La fenêtre modale partie CSS</a:t>
             </a:r>
             <a:endParaRPr kumimoji="0" lang="en-US" sz="2400" b="1" i="0" u="sng" strike="noStrike" kern="1200" cap="none" spc="0" normalizeH="0" baseline="0" noProof="0" dirty="0">
               <a:ln>
@@ -5440,10 +5436,10 @@
       </p:sp>
       <p:pic>
         <p:nvPicPr>
-          <p:cNvPr id="4" name="Image 3">
-            <a:extLst>
-              <a:ext uri="{FF2B5EF4-FFF2-40B4-BE49-F238E27FC236}">
-                <a16:creationId xmlns:a16="http://schemas.microsoft.com/office/drawing/2014/main" id="{AFAF8A3F-9406-632D-B4C0-677E4AD987D4}"/>
+          <p:cNvPr id="3" name="Image 2">
+            <a:extLst>
+              <a:ext uri="{FF2B5EF4-FFF2-40B4-BE49-F238E27FC236}">
+                <a16:creationId xmlns:a16="http://schemas.microsoft.com/office/drawing/2014/main" id="{84483699-45F8-7E46-2675-C8D52DC63AAC}"/>
               </a:ext>
             </a:extLst>
           </p:cNvPr>
@@ -5460,8 +5456,8 @@
         </p:blipFill>
         <p:spPr>
           <a:xfrm>
-            <a:off x="2347389" y="2687823"/>
-            <a:ext cx="7497221" cy="2029108"/>
+            <a:off x="4946156" y="2150024"/>
+            <a:ext cx="1614900" cy="4519439"/>
           </a:xfrm>
           <a:prstGeom prst="rect">
             <a:avLst/>
@@ -5471,7 +5467,7 @@
     </p:spTree>
     <p:extLst>
       <p:ext uri="{BB962C8B-B14F-4D97-AF65-F5344CB8AC3E}">
-        <p14:creationId xmlns:p14="http://schemas.microsoft.com/office/powerpoint/2010/main" val="2833991782"/>
+        <p14:creationId xmlns:p14="http://schemas.microsoft.com/office/powerpoint/2010/main" val="677539135"/>
       </p:ext>
     </p:extLst>
   </p:cSld>
@@ -5572,7 +5568,7 @@
                 <a:ea typeface="+mn-ea"/>
                 <a:cs typeface="+mn-cs"/>
               </a:rPr>
-              <a:t>III/ La suppression en javascript</a:t>
+              <a:t>II/ La fenêtre modale partie javascript</a:t>
             </a:r>
             <a:endParaRPr kumimoji="0" lang="en-US" sz="2400" b="1" i="0" u="sng" strike="noStrike" kern="1200" cap="none" spc="0" normalizeH="0" baseline="0" noProof="0" dirty="0">
               <a:ln>
@@ -5644,10 +5640,10 @@
       </p:sp>
       <p:pic>
         <p:nvPicPr>
-          <p:cNvPr id="3" name="Image 2">
-            <a:extLst>
-              <a:ext uri="{FF2B5EF4-FFF2-40B4-BE49-F238E27FC236}">
-                <a16:creationId xmlns:a16="http://schemas.microsoft.com/office/drawing/2014/main" id="{31EA3592-0D3B-C6E6-030E-30EC1C0C9E12}"/>
+          <p:cNvPr id="4" name="Image 3">
+            <a:extLst>
+              <a:ext uri="{FF2B5EF4-FFF2-40B4-BE49-F238E27FC236}">
+                <a16:creationId xmlns:a16="http://schemas.microsoft.com/office/drawing/2014/main" id="{AFAF8A3F-9406-632D-B4C0-677E4AD987D4}"/>
               </a:ext>
             </a:extLst>
           </p:cNvPr>
@@ -5664,8 +5660,8 @@
         </p:blipFill>
         <p:spPr>
           <a:xfrm>
-            <a:off x="3727406" y="2095135"/>
-            <a:ext cx="4737188" cy="4520321"/>
+            <a:off x="2347389" y="2687823"/>
+            <a:ext cx="7497221" cy="2029108"/>
           </a:xfrm>
           <a:prstGeom prst="rect">
             <a:avLst/>
@@ -5675,7 +5671,7 @@
     </p:spTree>
     <p:extLst>
       <p:ext uri="{BB962C8B-B14F-4D97-AF65-F5344CB8AC3E}">
-        <p14:creationId xmlns:p14="http://schemas.microsoft.com/office/powerpoint/2010/main" val="573718700"/>
+        <p14:creationId xmlns:p14="http://schemas.microsoft.com/office/powerpoint/2010/main" val="2833991782"/>
       </p:ext>
     </p:extLst>
   </p:cSld>
@@ -5716,156 +5712,6 @@
       </p:grpSpPr>
       <p:sp>
         <p:nvSpPr>
-          <p:cNvPr id="2" name="Titre 1">
-            <a:extLst>
-              <a:ext uri="{FF2B5EF4-FFF2-40B4-BE49-F238E27FC236}">
-                <a16:creationId xmlns:a16="http://schemas.microsoft.com/office/drawing/2014/main" id="{7E84A5D1-127D-1D31-4CE7-3C8C8455EB1D}"/>
-              </a:ext>
-            </a:extLst>
-          </p:cNvPr>
-          <p:cNvSpPr>
-            <a:spLocks noGrp="1"/>
-          </p:cNvSpPr>
-          <p:nvPr>
-            <p:ph type="title"/>
-          </p:nvPr>
-        </p:nvSpPr>
-        <p:spPr/>
-        <p:txBody>
-          <a:bodyPr>
-            <a:normAutofit/>
-          </a:bodyPr>
-          <a:lstStyle/>
-          <a:p>
-            <a:pPr algn="ctr"/>
-            <a:r>
-              <a:rPr lang="fr-FR" dirty="0">
-                <a:solidFill>
-                  <a:schemeClr val="accent1">
-                    <a:lumMod val="75000"/>
-                  </a:schemeClr>
-                </a:solidFill>
-                <a:latin typeface="Copperplate Gothic Bold" panose="020E0705020206020404" pitchFamily="34" charset="0"/>
-              </a:rPr>
-              <a:t>CINQUIEME TÂCHE: </a:t>
-            </a:r>
-            <a:br>
-              <a:rPr lang="fr-FR" dirty="0">
-                <a:solidFill>
-                  <a:schemeClr val="accent1">
-                    <a:lumMod val="75000"/>
-                  </a:schemeClr>
-                </a:solidFill>
-                <a:latin typeface="Copperplate Gothic Bold" panose="020E0705020206020404" pitchFamily="34" charset="0"/>
-              </a:rPr>
-            </a:br>
-            <a:r>
-              <a:rPr lang="fr-FR" dirty="0">
-                <a:solidFill>
-                  <a:schemeClr val="accent1">
-                    <a:lumMod val="75000"/>
-                  </a:schemeClr>
-                </a:solidFill>
-                <a:latin typeface="Copperplate Gothic Bold" panose="020E0705020206020404" pitchFamily="34" charset="0"/>
-              </a:rPr>
-              <a:t>LA MODALE D’AJOUT DE PROJET</a:t>
-            </a:r>
-            <a:endParaRPr lang="en-US" dirty="0"/>
-          </a:p>
-        </p:txBody>
-      </p:sp>
-      <p:pic>
-        <p:nvPicPr>
-          <p:cNvPr id="5" name="Image 4">
-            <a:extLst>
-              <a:ext uri="{FF2B5EF4-FFF2-40B4-BE49-F238E27FC236}">
-                <a16:creationId xmlns:a16="http://schemas.microsoft.com/office/drawing/2014/main" id="{2F21A507-D8D4-0807-6861-F444680B5C24}"/>
-              </a:ext>
-            </a:extLst>
-          </p:cNvPr>
-          <p:cNvPicPr>
-            <a:picLocks noChangeAspect="1"/>
-          </p:cNvPicPr>
-          <p:nvPr/>
-        </p:nvPicPr>
-        <p:blipFill>
-          <a:blip r:embed="rId2"/>
-          <a:stretch>
-            <a:fillRect/>
-          </a:stretch>
-        </p:blipFill>
-        <p:spPr>
-          <a:xfrm>
-            <a:off x="723889" y="2573518"/>
-            <a:ext cx="6013461" cy="3699475"/>
-          </a:xfrm>
-          <a:prstGeom prst="rect">
-            <a:avLst/>
-          </a:prstGeom>
-        </p:spPr>
-      </p:pic>
-      <p:pic>
-        <p:nvPicPr>
-          <p:cNvPr id="8" name="Image 7">
-            <a:extLst>
-              <a:ext uri="{FF2B5EF4-FFF2-40B4-BE49-F238E27FC236}">
-                <a16:creationId xmlns:a16="http://schemas.microsoft.com/office/drawing/2014/main" id="{26AFD66D-5ECF-9F0A-1C15-F3A7B16B6354}"/>
-              </a:ext>
-            </a:extLst>
-          </p:cNvPr>
-          <p:cNvPicPr>
-            <a:picLocks noChangeAspect="1"/>
-          </p:cNvPicPr>
-          <p:nvPr/>
-        </p:nvPicPr>
-        <p:blipFill>
-          <a:blip r:embed="rId3"/>
-          <a:stretch>
-            <a:fillRect/>
-          </a:stretch>
-        </p:blipFill>
-        <p:spPr>
-          <a:xfrm>
-            <a:off x="7150584" y="2069777"/>
-            <a:ext cx="4203216" cy="4203216"/>
-          </a:xfrm>
-          <a:prstGeom prst="rect">
-            <a:avLst/>
-          </a:prstGeom>
-        </p:spPr>
-      </p:pic>
-    </p:spTree>
-    <p:extLst>
-      <p:ext uri="{BB962C8B-B14F-4D97-AF65-F5344CB8AC3E}">
-        <p14:creationId xmlns:p14="http://schemas.microsoft.com/office/powerpoint/2010/main" val="3870636829"/>
-      </p:ext>
-    </p:extLst>
-  </p:cSld>
-  <p:clrMapOvr>
-    <a:masterClrMapping/>
-  </p:clrMapOvr>
-</p:sld>
-</file>
-
-<file path=ppt/slides/slide23.xml><?xml version="1.0" encoding="utf-8"?>
-<p:sld xmlns:a="http://schemas.openxmlformats.org/drawingml/2006/main" xmlns:r="http://schemas.openxmlformats.org/officeDocument/2006/relationships" xmlns:p="http://schemas.openxmlformats.org/presentationml/2006/main">
-  <p:cSld>
-    <p:spTree>
-      <p:nvGrpSpPr>
-        <p:cNvPr id="1" name=""/>
-        <p:cNvGrpSpPr/>
-        <p:nvPr/>
-      </p:nvGrpSpPr>
-      <p:grpSpPr>
-        <a:xfrm>
-          <a:off x="0" y="0"/>
-          <a:ext cx="0" cy="0"/>
-          <a:chOff x="0" y="0"/>
-          <a:chExt cx="0" cy="0"/>
-        </a:xfrm>
-      </p:grpSpPr>
-      <p:sp>
-        <p:nvSpPr>
           <p:cNvPr id="5" name="ZoneTexte 4">
             <a:extLst>
               <a:ext uri="{FF2B5EF4-FFF2-40B4-BE49-F238E27FC236}">
@@ -5926,7 +5772,7 @@
                 <a:ea typeface="+mn-ea"/>
                 <a:cs typeface="+mn-cs"/>
               </a:rPr>
-              <a:t>I/ La fenêtre modale partie HTML</a:t>
+              <a:t>III/ La suppression en javascript</a:t>
             </a:r>
             <a:endParaRPr kumimoji="0" lang="en-US" sz="2400" b="1" i="0" u="sng" strike="noStrike" kern="1200" cap="none" spc="0" normalizeH="0" baseline="0" noProof="0" dirty="0">
               <a:ln>
@@ -5983,7 +5829,7 @@
                 </a:solidFill>
                 <a:latin typeface="Copperplate Gothic Bold" panose="020E0705020206020404" pitchFamily="34" charset="0"/>
               </a:rPr>
-              <a:t>LA MODALE D’AJOUT DE PROJET</a:t>
+              <a:t>LA MODALE DE SUPRESSION DE PROJET</a:t>
             </a:r>
             <a:endParaRPr lang="en-US" dirty="0">
               <a:solidFill>
@@ -6001,7 +5847,7 @@
           <p:cNvPr id="3" name="Image 2">
             <a:extLst>
               <a:ext uri="{FF2B5EF4-FFF2-40B4-BE49-F238E27FC236}">
-                <a16:creationId xmlns:a16="http://schemas.microsoft.com/office/drawing/2014/main" id="{06E31964-EDD4-C0C4-9655-2F2FE74B7327}"/>
+                <a16:creationId xmlns:a16="http://schemas.microsoft.com/office/drawing/2014/main" id="{31EA3592-0D3B-C6E6-030E-30EC1C0C9E12}"/>
               </a:ext>
             </a:extLst>
           </p:cNvPr>
@@ -6018,8 +5864,8 @@
         </p:blipFill>
         <p:spPr>
           <a:xfrm>
-            <a:off x="3123995" y="2170424"/>
-            <a:ext cx="5944010" cy="4322451"/>
+            <a:off x="3727406" y="2095135"/>
+            <a:ext cx="4737188" cy="4520321"/>
           </a:xfrm>
           <a:prstGeom prst="rect">
             <a:avLst/>
@@ -6029,7 +5875,7 @@
     </p:spTree>
     <p:extLst>
       <p:ext uri="{BB962C8B-B14F-4D97-AF65-F5344CB8AC3E}">
-        <p14:creationId xmlns:p14="http://schemas.microsoft.com/office/powerpoint/2010/main" val="1740979205"/>
+        <p14:creationId xmlns:p14="http://schemas.microsoft.com/office/powerpoint/2010/main" val="573718700"/>
       </p:ext>
     </p:extLst>
   </p:cSld>
@@ -6051,6 +5897,156 @@
 </p:sld>
 </file>
 
+<file path=ppt/slides/slide23.xml><?xml version="1.0" encoding="utf-8"?>
+<p:sld xmlns:a="http://schemas.openxmlformats.org/drawingml/2006/main" xmlns:r="http://schemas.openxmlformats.org/officeDocument/2006/relationships" xmlns:p="http://schemas.openxmlformats.org/presentationml/2006/main">
+  <p:cSld>
+    <p:spTree>
+      <p:nvGrpSpPr>
+        <p:cNvPr id="1" name=""/>
+        <p:cNvGrpSpPr/>
+        <p:nvPr/>
+      </p:nvGrpSpPr>
+      <p:grpSpPr>
+        <a:xfrm>
+          <a:off x="0" y="0"/>
+          <a:ext cx="0" cy="0"/>
+          <a:chOff x="0" y="0"/>
+          <a:chExt cx="0" cy="0"/>
+        </a:xfrm>
+      </p:grpSpPr>
+      <p:sp>
+        <p:nvSpPr>
+          <p:cNvPr id="2" name="Titre 1">
+            <a:extLst>
+              <a:ext uri="{FF2B5EF4-FFF2-40B4-BE49-F238E27FC236}">
+                <a16:creationId xmlns:a16="http://schemas.microsoft.com/office/drawing/2014/main" id="{7E84A5D1-127D-1D31-4CE7-3C8C8455EB1D}"/>
+              </a:ext>
+            </a:extLst>
+          </p:cNvPr>
+          <p:cNvSpPr>
+            <a:spLocks noGrp="1"/>
+          </p:cNvSpPr>
+          <p:nvPr>
+            <p:ph type="title"/>
+          </p:nvPr>
+        </p:nvSpPr>
+        <p:spPr/>
+        <p:txBody>
+          <a:bodyPr>
+            <a:normAutofit/>
+          </a:bodyPr>
+          <a:lstStyle/>
+          <a:p>
+            <a:pPr algn="ctr"/>
+            <a:r>
+              <a:rPr lang="fr-FR" dirty="0">
+                <a:solidFill>
+                  <a:schemeClr val="accent1">
+                    <a:lumMod val="75000"/>
+                  </a:schemeClr>
+                </a:solidFill>
+                <a:latin typeface="Copperplate Gothic Bold" panose="020E0705020206020404" pitchFamily="34" charset="0"/>
+              </a:rPr>
+              <a:t>CINQUIEME TÂCHE: </a:t>
+            </a:r>
+            <a:br>
+              <a:rPr lang="fr-FR" dirty="0">
+                <a:solidFill>
+                  <a:schemeClr val="accent1">
+                    <a:lumMod val="75000"/>
+                  </a:schemeClr>
+                </a:solidFill>
+                <a:latin typeface="Copperplate Gothic Bold" panose="020E0705020206020404" pitchFamily="34" charset="0"/>
+              </a:rPr>
+            </a:br>
+            <a:r>
+              <a:rPr lang="fr-FR" dirty="0">
+                <a:solidFill>
+                  <a:schemeClr val="accent1">
+                    <a:lumMod val="75000"/>
+                  </a:schemeClr>
+                </a:solidFill>
+                <a:latin typeface="Copperplate Gothic Bold" panose="020E0705020206020404" pitchFamily="34" charset="0"/>
+              </a:rPr>
+              <a:t>LA MODALE D’AJOUT DE PROJET</a:t>
+            </a:r>
+            <a:endParaRPr lang="en-US" dirty="0"/>
+          </a:p>
+        </p:txBody>
+      </p:sp>
+      <p:pic>
+        <p:nvPicPr>
+          <p:cNvPr id="5" name="Image 4">
+            <a:extLst>
+              <a:ext uri="{FF2B5EF4-FFF2-40B4-BE49-F238E27FC236}">
+                <a16:creationId xmlns:a16="http://schemas.microsoft.com/office/drawing/2014/main" id="{2F21A507-D8D4-0807-6861-F444680B5C24}"/>
+              </a:ext>
+            </a:extLst>
+          </p:cNvPr>
+          <p:cNvPicPr>
+            <a:picLocks noChangeAspect="1"/>
+          </p:cNvPicPr>
+          <p:nvPr/>
+        </p:nvPicPr>
+        <p:blipFill>
+          <a:blip r:embed="rId2"/>
+          <a:stretch>
+            <a:fillRect/>
+          </a:stretch>
+        </p:blipFill>
+        <p:spPr>
+          <a:xfrm>
+            <a:off x="723889" y="2573518"/>
+            <a:ext cx="6013461" cy="3699475"/>
+          </a:xfrm>
+          <a:prstGeom prst="rect">
+            <a:avLst/>
+          </a:prstGeom>
+        </p:spPr>
+      </p:pic>
+      <p:pic>
+        <p:nvPicPr>
+          <p:cNvPr id="8" name="Image 7">
+            <a:extLst>
+              <a:ext uri="{FF2B5EF4-FFF2-40B4-BE49-F238E27FC236}">
+                <a16:creationId xmlns:a16="http://schemas.microsoft.com/office/drawing/2014/main" id="{26AFD66D-5ECF-9F0A-1C15-F3A7B16B6354}"/>
+              </a:ext>
+            </a:extLst>
+          </p:cNvPr>
+          <p:cNvPicPr>
+            <a:picLocks noChangeAspect="1"/>
+          </p:cNvPicPr>
+          <p:nvPr/>
+        </p:nvPicPr>
+        <p:blipFill>
+          <a:blip r:embed="rId3"/>
+          <a:stretch>
+            <a:fillRect/>
+          </a:stretch>
+        </p:blipFill>
+        <p:spPr>
+          <a:xfrm>
+            <a:off x="7150584" y="2069777"/>
+            <a:ext cx="4203216" cy="4203216"/>
+          </a:xfrm>
+          <a:prstGeom prst="rect">
+            <a:avLst/>
+          </a:prstGeom>
+        </p:spPr>
+      </p:pic>
+    </p:spTree>
+    <p:extLst>
+      <p:ext uri="{BB962C8B-B14F-4D97-AF65-F5344CB8AC3E}">
+        <p14:creationId xmlns:p14="http://schemas.microsoft.com/office/powerpoint/2010/main" val="3870636829"/>
+      </p:ext>
+    </p:extLst>
+  </p:cSld>
+  <p:clrMapOvr>
+    <a:masterClrMapping/>
+  </p:clrMapOvr>
+</p:sld>
+</file>
+
 <file path=ppt/slides/slide24.xml><?xml version="1.0" encoding="utf-8"?>
 <p:sld xmlns:a="http://schemas.openxmlformats.org/drawingml/2006/main" xmlns:r="http://schemas.openxmlformats.org/officeDocument/2006/relationships" xmlns:p="http://schemas.openxmlformats.org/presentationml/2006/main">
   <p:cSld>
@@ -6130,7 +6126,7 @@
                 <a:ea typeface="+mn-ea"/>
                 <a:cs typeface="+mn-cs"/>
               </a:rPr>
-              <a:t>II/ La fenêtre modale partie javascript</a:t>
+              <a:t>I/ La fenêtre modale partie HTML</a:t>
             </a:r>
             <a:endParaRPr kumimoji="0" lang="en-US" sz="2400" b="1" i="0" u="sng" strike="noStrike" kern="1200" cap="none" spc="0" normalizeH="0" baseline="0" noProof="0" dirty="0">
               <a:ln>
@@ -6202,10 +6198,10 @@
       </p:sp>
       <p:pic>
         <p:nvPicPr>
-          <p:cNvPr id="7" name="Image 6">
-            <a:extLst>
-              <a:ext uri="{FF2B5EF4-FFF2-40B4-BE49-F238E27FC236}">
-                <a16:creationId xmlns:a16="http://schemas.microsoft.com/office/drawing/2014/main" id="{182BDE22-5D7D-43D8-01BE-AE5C7E5C9775}"/>
+          <p:cNvPr id="3" name="Image 2">
+            <a:extLst>
+              <a:ext uri="{FF2B5EF4-FFF2-40B4-BE49-F238E27FC236}">
+                <a16:creationId xmlns:a16="http://schemas.microsoft.com/office/drawing/2014/main" id="{06E31964-EDD4-C0C4-9655-2F2FE74B7327}"/>
               </a:ext>
             </a:extLst>
           </p:cNvPr>
@@ -6222,8 +6218,8 @@
         </p:blipFill>
         <p:spPr>
           <a:xfrm>
-            <a:off x="2709105" y="2292337"/>
-            <a:ext cx="6773790" cy="4011908"/>
+            <a:off x="3123995" y="2170424"/>
+            <a:ext cx="5944010" cy="4322451"/>
           </a:xfrm>
           <a:prstGeom prst="rect">
             <a:avLst/>
@@ -6233,7 +6229,7 @@
     </p:spTree>
     <p:extLst>
       <p:ext uri="{BB962C8B-B14F-4D97-AF65-F5344CB8AC3E}">
-        <p14:creationId xmlns:p14="http://schemas.microsoft.com/office/powerpoint/2010/main" val="243903528"/>
+        <p14:creationId xmlns:p14="http://schemas.microsoft.com/office/powerpoint/2010/main" val="1740979205"/>
       </p:ext>
     </p:extLst>
   </p:cSld>
@@ -6334,7 +6330,7 @@
                 <a:ea typeface="+mn-ea"/>
                 <a:cs typeface="+mn-cs"/>
               </a:rPr>
-              <a:t>III/ L’affichage de l’image</a:t>
+              <a:t>II/ La fenêtre modale partie javascript</a:t>
             </a:r>
             <a:endParaRPr kumimoji="0" lang="en-US" sz="2400" b="1" i="0" u="sng" strike="noStrike" kern="1200" cap="none" spc="0" normalizeH="0" baseline="0" noProof="0" dirty="0">
               <a:ln>
@@ -6406,10 +6402,10 @@
       </p:sp>
       <p:pic>
         <p:nvPicPr>
-          <p:cNvPr id="4" name="Image 3">
-            <a:extLst>
-              <a:ext uri="{FF2B5EF4-FFF2-40B4-BE49-F238E27FC236}">
-                <a16:creationId xmlns:a16="http://schemas.microsoft.com/office/drawing/2014/main" id="{E8EBF355-F20A-AF71-1861-E00794C965CD}"/>
+          <p:cNvPr id="7" name="Image 6">
+            <a:extLst>
+              <a:ext uri="{FF2B5EF4-FFF2-40B4-BE49-F238E27FC236}">
+                <a16:creationId xmlns:a16="http://schemas.microsoft.com/office/drawing/2014/main" id="{182BDE22-5D7D-43D8-01BE-AE5C7E5C9775}"/>
               </a:ext>
             </a:extLst>
           </p:cNvPr>
@@ -6426,8 +6422,8 @@
         </p:blipFill>
         <p:spPr>
           <a:xfrm>
-            <a:off x="3745470" y="2111356"/>
-            <a:ext cx="5134692" cy="4315427"/>
+            <a:off x="2709105" y="2292337"/>
+            <a:ext cx="6773790" cy="4011908"/>
           </a:xfrm>
           <a:prstGeom prst="rect">
             <a:avLst/>
@@ -6437,7 +6433,7 @@
     </p:spTree>
     <p:extLst>
       <p:ext uri="{BB962C8B-B14F-4D97-AF65-F5344CB8AC3E}">
-        <p14:creationId xmlns:p14="http://schemas.microsoft.com/office/powerpoint/2010/main" val="26468565"/>
+        <p14:creationId xmlns:p14="http://schemas.microsoft.com/office/powerpoint/2010/main" val="243903528"/>
       </p:ext>
     </p:extLst>
   </p:cSld>
@@ -6538,7 +6534,7 @@
                 <a:ea typeface="+mn-ea"/>
                 <a:cs typeface="+mn-cs"/>
               </a:rPr>
-              <a:t>IV/ L’ajout de projet</a:t>
+              <a:t>III/ L’affichage de l’image</a:t>
             </a:r>
             <a:endParaRPr kumimoji="0" lang="en-US" sz="2400" b="1" i="0" u="sng" strike="noStrike" kern="1200" cap="none" spc="0" normalizeH="0" baseline="0" noProof="0" dirty="0">
               <a:ln>
@@ -6610,10 +6606,10 @@
       </p:sp>
       <p:pic>
         <p:nvPicPr>
-          <p:cNvPr id="3" name="Image 2">
-            <a:extLst>
-              <a:ext uri="{FF2B5EF4-FFF2-40B4-BE49-F238E27FC236}">
-                <a16:creationId xmlns:a16="http://schemas.microsoft.com/office/drawing/2014/main" id="{E14A4974-C33B-090B-F9D8-27A1780CA27B}"/>
+          <p:cNvPr id="4" name="Image 3">
+            <a:extLst>
+              <a:ext uri="{FF2B5EF4-FFF2-40B4-BE49-F238E27FC236}">
+                <a16:creationId xmlns:a16="http://schemas.microsoft.com/office/drawing/2014/main" id="{E8EBF355-F20A-AF71-1861-E00794C965CD}"/>
               </a:ext>
             </a:extLst>
           </p:cNvPr>
@@ -6630,8 +6626,8 @@
         </p:blipFill>
         <p:spPr>
           <a:xfrm>
-            <a:off x="3650179" y="2124207"/>
-            <a:ext cx="4749104" cy="4368668"/>
+            <a:off x="3745470" y="2111356"/>
+            <a:ext cx="5134692" cy="4315427"/>
           </a:xfrm>
           <a:prstGeom prst="rect">
             <a:avLst/>
@@ -6641,7 +6637,7 @@
     </p:spTree>
     <p:extLst>
       <p:ext uri="{BB962C8B-B14F-4D97-AF65-F5344CB8AC3E}">
-        <p14:creationId xmlns:p14="http://schemas.microsoft.com/office/powerpoint/2010/main" val="1704762101"/>
+        <p14:creationId xmlns:p14="http://schemas.microsoft.com/office/powerpoint/2010/main" val="26468565"/>
       </p:ext>
     </p:extLst>
   </p:cSld>
@@ -6814,10 +6810,10 @@
       </p:sp>
       <p:pic>
         <p:nvPicPr>
-          <p:cNvPr id="4" name="Image 3">
-            <a:extLst>
-              <a:ext uri="{FF2B5EF4-FFF2-40B4-BE49-F238E27FC236}">
-                <a16:creationId xmlns:a16="http://schemas.microsoft.com/office/drawing/2014/main" id="{CC3D8F3A-9424-B7A3-8495-393BD3060873}"/>
+          <p:cNvPr id="3" name="Image 2">
+            <a:extLst>
+              <a:ext uri="{FF2B5EF4-FFF2-40B4-BE49-F238E27FC236}">
+                <a16:creationId xmlns:a16="http://schemas.microsoft.com/office/drawing/2014/main" id="{E14A4974-C33B-090B-F9D8-27A1780CA27B}"/>
               </a:ext>
             </a:extLst>
           </p:cNvPr>
@@ -6834,8 +6830,8 @@
         </p:blipFill>
         <p:spPr>
           <a:xfrm>
-            <a:off x="4001678" y="1893647"/>
-            <a:ext cx="4714130" cy="4888937"/>
+            <a:off x="3650179" y="2124207"/>
+            <a:ext cx="4749104" cy="4368668"/>
           </a:xfrm>
           <a:prstGeom prst="rect">
             <a:avLst/>
@@ -6845,7 +6841,7 @@
     </p:spTree>
     <p:extLst>
       <p:ext uri="{BB962C8B-B14F-4D97-AF65-F5344CB8AC3E}">
-        <p14:creationId xmlns:p14="http://schemas.microsoft.com/office/powerpoint/2010/main" val="3605730904"/>
+        <p14:creationId xmlns:p14="http://schemas.microsoft.com/office/powerpoint/2010/main" val="1704762101"/>
       </p:ext>
     </p:extLst>
   </p:cSld>
@@ -6886,10 +6882,93 @@
       </p:grpSpPr>
       <p:sp>
         <p:nvSpPr>
-          <p:cNvPr id="2" name="Titre 1">
-            <a:extLst>
-              <a:ext uri="{FF2B5EF4-FFF2-40B4-BE49-F238E27FC236}">
-                <a16:creationId xmlns:a16="http://schemas.microsoft.com/office/drawing/2014/main" id="{B9CB8986-52A4-6385-C6A1-AD6933FFB237}"/>
+          <p:cNvPr id="5" name="ZoneTexte 4">
+            <a:extLst>
+              <a:ext uri="{FF2B5EF4-FFF2-40B4-BE49-F238E27FC236}">
+                <a16:creationId xmlns:a16="http://schemas.microsoft.com/office/drawing/2014/main" id="{CE01E8F6-9D91-F8D8-90CE-DBF5D2D1610B}"/>
+              </a:ext>
+            </a:extLst>
+          </p:cNvPr>
+          <p:cNvSpPr txBox="1"/>
+          <p:nvPr/>
+        </p:nvSpPr>
+        <p:spPr>
+          <a:xfrm>
+            <a:off x="377072" y="1564849"/>
+            <a:ext cx="7249213" cy="461665"/>
+          </a:xfrm>
+          <a:prstGeom prst="rect">
+            <a:avLst/>
+          </a:prstGeom>
+          <a:noFill/>
+        </p:spPr>
+        <p:txBody>
+          <a:bodyPr wrap="square" rtlCol="0">
+            <a:spAutoFit/>
+          </a:bodyPr>
+          <a:lstStyle/>
+          <a:p>
+            <a:pPr marL="0" marR="0" lvl="0" indent="0" algn="l" defTabSz="914400" rtl="0" eaLnBrk="1" fontAlgn="auto" latinLnBrk="0" hangingPunct="1">
+              <a:lnSpc>
+                <a:spcPct val="100000"/>
+              </a:lnSpc>
+              <a:spcBef>
+                <a:spcPts val="0"/>
+              </a:spcBef>
+              <a:spcAft>
+                <a:spcPts val="0"/>
+              </a:spcAft>
+              <a:buClrTx/>
+              <a:buSzTx/>
+              <a:buFontTx/>
+              <a:buNone/>
+              <a:tabLst/>
+              <a:defRPr/>
+            </a:pPr>
+            <a:r>
+              <a:rPr kumimoji="0" lang="fr-FR" sz="2400" b="1" i="0" u="sng" strike="noStrike" kern="1200" cap="none" spc="0" normalizeH="0" baseline="0" noProof="0" dirty="0">
+                <a:ln>
+                  <a:noFill/>
+                </a:ln>
+                <a:solidFill>
+                  <a:schemeClr val="accent1">
+                    <a:lumMod val="75000"/>
+                  </a:schemeClr>
+                </a:solidFill>
+                <a:effectLst/>
+                <a:uLnTx/>
+                <a:uFillTx/>
+                <a:latin typeface="Calibri" panose="020F0502020204030204"/>
+                <a:ea typeface="+mn-ea"/>
+                <a:cs typeface="+mn-cs"/>
+              </a:rPr>
+              <a:t>IV/ L’ajout de projet</a:t>
+            </a:r>
+            <a:endParaRPr kumimoji="0" lang="en-US" sz="2400" b="1" i="0" u="sng" strike="noStrike" kern="1200" cap="none" spc="0" normalizeH="0" baseline="0" noProof="0" dirty="0">
+              <a:ln>
+                <a:noFill/>
+              </a:ln>
+              <a:solidFill>
+                <a:schemeClr val="accent1">
+                  <a:lumMod val="75000"/>
+                </a:schemeClr>
+              </a:solidFill>
+              <a:effectLst/>
+              <a:uLnTx/>
+              <a:uFillTx/>
+              <a:latin typeface="Calibri" panose="020F0502020204030204"/>
+              <a:ea typeface="+mn-ea"/>
+              <a:cs typeface="+mn-cs"/>
+            </a:endParaRPr>
+          </a:p>
+        </p:txBody>
+      </p:sp>
+      <p:sp>
+        <p:nvSpPr>
+          <p:cNvPr id="8" name="Titre 1">
+            <a:extLst>
+              <a:ext uri="{FF2B5EF4-FFF2-40B4-BE49-F238E27FC236}">
+                <a16:creationId xmlns:a16="http://schemas.microsoft.com/office/drawing/2014/main" id="{C7CE8BF2-ECFD-0983-566E-BAC4213C32C1}"/>
               </a:ext>
             </a:extLst>
           </p:cNvPr>
@@ -6900,7 +6979,12 @@
             <p:ph type="title"/>
           </p:nvPr>
         </p:nvSpPr>
-        <p:spPr/>
+        <p:spPr>
+          <a:xfrm>
+            <a:off x="838200" y="365125"/>
+            <a:ext cx="10515600" cy="1325563"/>
+          </a:xfrm>
+        </p:spPr>
         <p:txBody>
           <a:bodyPr/>
           <a:lstStyle/>
@@ -6915,7 +6999,7 @@
                 </a:solidFill>
                 <a:latin typeface="Copperplate Gothic Bold" panose="020E0705020206020404" pitchFamily="34" charset="0"/>
               </a:rPr>
-              <a:t>LES OUTILS</a:t>
+              <a:t>LA MODALE D’AJOUT DE PROJET</a:t>
             </a:r>
             <a:endParaRPr lang="en-US" dirty="0">
               <a:solidFill>
@@ -6928,200 +7012,40 @@
           </a:p>
         </p:txBody>
       </p:sp>
-      <p:sp>
-        <p:nvSpPr>
-          <p:cNvPr id="5" name="ZoneTexte 4">
-            <a:extLst>
-              <a:ext uri="{FF2B5EF4-FFF2-40B4-BE49-F238E27FC236}">
-                <a16:creationId xmlns:a16="http://schemas.microsoft.com/office/drawing/2014/main" id="{CE01E8F6-9D91-F8D8-90CE-DBF5D2D1610B}"/>
-              </a:ext>
-            </a:extLst>
-          </p:cNvPr>
-          <p:cNvSpPr txBox="1"/>
+      <p:pic>
+        <p:nvPicPr>
+          <p:cNvPr id="4" name="Image 3">
+            <a:extLst>
+              <a:ext uri="{FF2B5EF4-FFF2-40B4-BE49-F238E27FC236}">
+                <a16:creationId xmlns:a16="http://schemas.microsoft.com/office/drawing/2014/main" id="{CC3D8F3A-9424-B7A3-8495-393BD3060873}"/>
+              </a:ext>
+            </a:extLst>
+          </p:cNvPr>
+          <p:cNvPicPr>
+            <a:picLocks noChangeAspect="1"/>
+          </p:cNvPicPr>
           <p:nvPr/>
-        </p:nvSpPr>
-        <p:spPr>
-          <a:xfrm>
-            <a:off x="377072" y="1564849"/>
-            <a:ext cx="5718928" cy="461665"/>
+        </p:nvPicPr>
+        <p:blipFill>
+          <a:blip r:embed="rId2"/>
+          <a:stretch>
+            <a:fillRect/>
+          </a:stretch>
+        </p:blipFill>
+        <p:spPr>
+          <a:xfrm>
+            <a:off x="4001678" y="1893647"/>
+            <a:ext cx="4714130" cy="4888937"/>
           </a:xfrm>
           <a:prstGeom prst="rect">
             <a:avLst/>
           </a:prstGeom>
-          <a:noFill/>
-        </p:spPr>
-        <p:txBody>
-          <a:bodyPr wrap="square" rtlCol="0">
-            <a:spAutoFit/>
-          </a:bodyPr>
-          <a:lstStyle/>
-          <a:p>
-            <a:r>
-              <a:rPr lang="fr-FR" sz="2400" b="1" u="sng" dirty="0">
-                <a:solidFill>
-                  <a:schemeClr val="accent1">
-                    <a:lumMod val="75000"/>
-                  </a:schemeClr>
-                </a:solidFill>
-              </a:rPr>
-              <a:t>I/ Les validateurs de code</a:t>
-            </a:r>
-            <a:endParaRPr lang="en-US" sz="2400" b="1" u="sng" dirty="0">
-              <a:solidFill>
-                <a:schemeClr val="accent1">
-                  <a:lumMod val="75000"/>
-                </a:schemeClr>
-              </a:solidFill>
-            </a:endParaRPr>
-          </a:p>
-        </p:txBody>
-      </p:sp>
-      <p:sp>
-        <p:nvSpPr>
-          <p:cNvPr id="3" name="ZoneTexte 2">
-            <a:extLst>
-              <a:ext uri="{FF2B5EF4-FFF2-40B4-BE49-F238E27FC236}">
-                <a16:creationId xmlns:a16="http://schemas.microsoft.com/office/drawing/2014/main" id="{B9113854-17DB-6DD9-35F5-015C1AA88EA4}"/>
-              </a:ext>
-            </a:extLst>
-          </p:cNvPr>
-          <p:cNvSpPr txBox="1"/>
-          <p:nvPr/>
-        </p:nvSpPr>
-        <p:spPr>
-          <a:xfrm>
-            <a:off x="2705492" y="3586056"/>
-            <a:ext cx="5297864" cy="369332"/>
-          </a:xfrm>
-          <a:prstGeom prst="rect">
-            <a:avLst/>
-          </a:prstGeom>
-          <a:noFill/>
-        </p:spPr>
-        <p:txBody>
-          <a:bodyPr wrap="square" rtlCol="0">
-            <a:spAutoFit/>
-          </a:bodyPr>
-          <a:lstStyle/>
-          <a:p>
-            <a:r>
-              <a:rPr lang="en-US" dirty="0"/>
-              <a:t>https://validator.w3.org/#validate_by_upload</a:t>
-            </a:r>
-          </a:p>
-        </p:txBody>
-      </p:sp>
-      <p:sp>
-        <p:nvSpPr>
-          <p:cNvPr id="4" name="ZoneTexte 3">
-            <a:extLst>
-              <a:ext uri="{FF2B5EF4-FFF2-40B4-BE49-F238E27FC236}">
-                <a16:creationId xmlns:a16="http://schemas.microsoft.com/office/drawing/2014/main" id="{02F8C5B3-5ADE-05AA-5CE4-FE4BDA601270}"/>
-              </a:ext>
-            </a:extLst>
-          </p:cNvPr>
-          <p:cNvSpPr txBox="1"/>
-          <p:nvPr/>
-        </p:nvSpPr>
-        <p:spPr>
-          <a:xfrm>
-            <a:off x="2705492" y="5030293"/>
-            <a:ext cx="5542960" cy="369332"/>
-          </a:xfrm>
-          <a:prstGeom prst="rect">
-            <a:avLst/>
-          </a:prstGeom>
-          <a:noFill/>
-        </p:spPr>
-        <p:txBody>
-          <a:bodyPr wrap="square" rtlCol="0">
-            <a:spAutoFit/>
-          </a:bodyPr>
-          <a:lstStyle/>
-          <a:p>
-            <a:r>
-              <a:rPr lang="en-US" dirty="0"/>
-              <a:t>https://jigsaw.w3.org/css-validator/#validate_by_upload</a:t>
-            </a:r>
-          </a:p>
-        </p:txBody>
-      </p:sp>
-      <p:sp>
-        <p:nvSpPr>
-          <p:cNvPr id="6" name="ZoneTexte 5">
-            <a:extLst>
-              <a:ext uri="{FF2B5EF4-FFF2-40B4-BE49-F238E27FC236}">
-                <a16:creationId xmlns:a16="http://schemas.microsoft.com/office/drawing/2014/main" id="{3F4A00E3-E539-905F-AD33-A9F94C4D6BF7}"/>
-              </a:ext>
-            </a:extLst>
-          </p:cNvPr>
-          <p:cNvSpPr txBox="1"/>
-          <p:nvPr/>
-        </p:nvSpPr>
-        <p:spPr>
-          <a:xfrm>
-            <a:off x="612742" y="3101419"/>
-            <a:ext cx="2799761" cy="369332"/>
-          </a:xfrm>
-          <a:prstGeom prst="rect">
-            <a:avLst/>
-          </a:prstGeom>
-          <a:noFill/>
-        </p:spPr>
-        <p:txBody>
-          <a:bodyPr wrap="square" rtlCol="0">
-            <a:spAutoFit/>
-          </a:bodyPr>
-          <a:lstStyle/>
-          <a:p>
-            <a:r>
-              <a:rPr lang="fr-FR" dirty="0"/>
-              <a:t>Validateur HTML :</a:t>
-            </a:r>
-            <a:endParaRPr lang="en-US" dirty="0"/>
-          </a:p>
-        </p:txBody>
-      </p:sp>
-      <p:sp>
-        <p:nvSpPr>
-          <p:cNvPr id="7" name="ZoneTexte 6">
-            <a:extLst>
-              <a:ext uri="{FF2B5EF4-FFF2-40B4-BE49-F238E27FC236}">
-                <a16:creationId xmlns:a16="http://schemas.microsoft.com/office/drawing/2014/main" id="{17533E0B-4499-6902-A842-023093B6C1FA}"/>
-              </a:ext>
-            </a:extLst>
-          </p:cNvPr>
-          <p:cNvSpPr txBox="1"/>
-          <p:nvPr/>
-        </p:nvSpPr>
-        <p:spPr>
-          <a:xfrm>
-            <a:off x="612742" y="4440026"/>
-            <a:ext cx="2092750" cy="369332"/>
-          </a:xfrm>
-          <a:prstGeom prst="rect">
-            <a:avLst/>
-          </a:prstGeom>
-          <a:noFill/>
-        </p:spPr>
-        <p:txBody>
-          <a:bodyPr wrap="square" rtlCol="0">
-            <a:spAutoFit/>
-          </a:bodyPr>
-          <a:lstStyle/>
-          <a:p>
-            <a:r>
-              <a:rPr lang="fr-FR" dirty="0"/>
-              <a:t>Validateur CSS :</a:t>
-            </a:r>
-            <a:endParaRPr lang="en-US" dirty="0"/>
-          </a:p>
-        </p:txBody>
-      </p:sp>
+        </p:spPr>
+      </p:pic>
     </p:spTree>
     <p:extLst>
       <p:ext uri="{BB962C8B-B14F-4D97-AF65-F5344CB8AC3E}">
-        <p14:creationId xmlns:p14="http://schemas.microsoft.com/office/powerpoint/2010/main" val="1417337721"/>
+        <p14:creationId xmlns:p14="http://schemas.microsoft.com/office/powerpoint/2010/main" val="3605730904"/>
       </p:ext>
     </p:extLst>
   </p:cSld>
@@ -7240,7 +7164,7 @@
                   </a:schemeClr>
                 </a:solidFill>
               </a:rPr>
-              <a:t>II/ Git et Git Hub</a:t>
+              <a:t>I/ Les validateurs de code</a:t>
             </a:r>
             <a:endParaRPr lang="en-US" sz="2400" b="1" u="sng" dirty="0">
               <a:solidFill>
@@ -7252,40 +7176,154 @@
           </a:p>
         </p:txBody>
       </p:sp>
-      <p:pic>
-        <p:nvPicPr>
-          <p:cNvPr id="7" name="Image 6">
-            <a:extLst>
-              <a:ext uri="{FF2B5EF4-FFF2-40B4-BE49-F238E27FC236}">
-                <a16:creationId xmlns:a16="http://schemas.microsoft.com/office/drawing/2014/main" id="{C415D70D-0D53-05C4-4F60-E0F7EF3A32C6}"/>
-              </a:ext>
-            </a:extLst>
-          </p:cNvPr>
-          <p:cNvPicPr>
-            <a:picLocks noChangeAspect="1"/>
-          </p:cNvPicPr>
+      <p:sp>
+        <p:nvSpPr>
+          <p:cNvPr id="3" name="ZoneTexte 2">
+            <a:hlinkClick r:id="rId2"/>
+            <a:extLst>
+              <a:ext uri="{FF2B5EF4-FFF2-40B4-BE49-F238E27FC236}">
+                <a16:creationId xmlns:a16="http://schemas.microsoft.com/office/drawing/2014/main" id="{B9113854-17DB-6DD9-35F5-015C1AA88EA4}"/>
+              </a:ext>
+            </a:extLst>
+          </p:cNvPr>
+          <p:cNvSpPr txBox="1"/>
           <p:nvPr/>
-        </p:nvPicPr>
-        <p:blipFill>
-          <a:blip r:embed="rId2"/>
-          <a:stretch>
-            <a:fillRect/>
-          </a:stretch>
-        </p:blipFill>
-        <p:spPr>
-          <a:xfrm>
-            <a:off x="1241196" y="2579196"/>
-            <a:ext cx="9709608" cy="2252291"/>
+        </p:nvSpPr>
+        <p:spPr>
+          <a:xfrm>
+            <a:off x="2705492" y="3586056"/>
+            <a:ext cx="5297864" cy="369332"/>
           </a:xfrm>
           <a:prstGeom prst="rect">
             <a:avLst/>
           </a:prstGeom>
-        </p:spPr>
-      </p:pic>
+          <a:noFill/>
+        </p:spPr>
+        <p:txBody>
+          <a:bodyPr wrap="square" rtlCol="0">
+            <a:spAutoFit/>
+          </a:bodyPr>
+          <a:lstStyle/>
+          <a:p>
+            <a:r>
+              <a:rPr lang="en-US" dirty="0"/>
+              <a:t>https://validator.w3.org/#validate_by_upload</a:t>
+            </a:r>
+          </a:p>
+        </p:txBody>
+      </p:sp>
+      <p:sp>
+        <p:nvSpPr>
+          <p:cNvPr id="4" name="ZoneTexte 3">
+            <a:hlinkClick r:id="rId3"/>
+            <a:extLst>
+              <a:ext uri="{FF2B5EF4-FFF2-40B4-BE49-F238E27FC236}">
+                <a16:creationId xmlns:a16="http://schemas.microsoft.com/office/drawing/2014/main" id="{02F8C5B3-5ADE-05AA-5CE4-FE4BDA601270}"/>
+              </a:ext>
+            </a:extLst>
+          </p:cNvPr>
+          <p:cNvSpPr txBox="1"/>
+          <p:nvPr/>
+        </p:nvSpPr>
+        <p:spPr>
+          <a:xfrm>
+            <a:off x="2705492" y="5030293"/>
+            <a:ext cx="5542960" cy="369332"/>
+          </a:xfrm>
+          <a:prstGeom prst="rect">
+            <a:avLst/>
+          </a:prstGeom>
+          <a:noFill/>
+        </p:spPr>
+        <p:txBody>
+          <a:bodyPr wrap="square" rtlCol="0">
+            <a:spAutoFit/>
+          </a:bodyPr>
+          <a:lstStyle/>
+          <a:p>
+            <a:r>
+              <a:rPr lang="en-US" dirty="0"/>
+              <a:t>https://jigsaw.w3.org/css-validator/#validate_by_upload</a:t>
+            </a:r>
+          </a:p>
+        </p:txBody>
+      </p:sp>
+      <p:sp>
+        <p:nvSpPr>
+          <p:cNvPr id="6" name="ZoneTexte 5">
+            <a:extLst>
+              <a:ext uri="{FF2B5EF4-FFF2-40B4-BE49-F238E27FC236}">
+                <a16:creationId xmlns:a16="http://schemas.microsoft.com/office/drawing/2014/main" id="{3F4A00E3-E539-905F-AD33-A9F94C4D6BF7}"/>
+              </a:ext>
+            </a:extLst>
+          </p:cNvPr>
+          <p:cNvSpPr txBox="1"/>
+          <p:nvPr/>
+        </p:nvSpPr>
+        <p:spPr>
+          <a:xfrm>
+            <a:off x="612742" y="3101419"/>
+            <a:ext cx="2799761" cy="369332"/>
+          </a:xfrm>
+          <a:prstGeom prst="rect">
+            <a:avLst/>
+          </a:prstGeom>
+          <a:noFill/>
+        </p:spPr>
+        <p:txBody>
+          <a:bodyPr wrap="square" rtlCol="0">
+            <a:spAutoFit/>
+          </a:bodyPr>
+          <a:lstStyle/>
+          <a:p>
+            <a:r>
+              <a:rPr lang="fr-FR" dirty="0"/>
+              <a:t>Validateur HTML :</a:t>
+            </a:r>
+            <a:endParaRPr lang="en-US" dirty="0"/>
+          </a:p>
+        </p:txBody>
+      </p:sp>
+      <p:sp>
+        <p:nvSpPr>
+          <p:cNvPr id="7" name="ZoneTexte 6">
+            <a:extLst>
+              <a:ext uri="{FF2B5EF4-FFF2-40B4-BE49-F238E27FC236}">
+                <a16:creationId xmlns:a16="http://schemas.microsoft.com/office/drawing/2014/main" id="{17533E0B-4499-6902-A842-023093B6C1FA}"/>
+              </a:ext>
+            </a:extLst>
+          </p:cNvPr>
+          <p:cNvSpPr txBox="1"/>
+          <p:nvPr/>
+        </p:nvSpPr>
+        <p:spPr>
+          <a:xfrm>
+            <a:off x="612742" y="4440026"/>
+            <a:ext cx="2092750" cy="369332"/>
+          </a:xfrm>
+          <a:prstGeom prst="rect">
+            <a:avLst/>
+          </a:prstGeom>
+          <a:noFill/>
+        </p:spPr>
+        <p:txBody>
+          <a:bodyPr wrap="square" rtlCol="0">
+            <a:spAutoFit/>
+          </a:bodyPr>
+          <a:lstStyle/>
+          <a:p>
+            <a:r>
+              <a:rPr lang="fr-FR" dirty="0"/>
+              <a:t>Validateur CSS :</a:t>
+            </a:r>
+            <a:endParaRPr lang="en-US" dirty="0"/>
+          </a:p>
+        </p:txBody>
+      </p:sp>
     </p:spTree>
     <p:extLst>
       <p:ext uri="{BB962C8B-B14F-4D97-AF65-F5344CB8AC3E}">
-        <p14:creationId xmlns:p14="http://schemas.microsoft.com/office/powerpoint/2010/main" val="1613361156"/>
+        <p14:creationId xmlns:p14="http://schemas.microsoft.com/office/powerpoint/2010/main" val="1417337721"/>
       </p:ext>
     </p:extLst>
   </p:cSld>
@@ -7654,6 +7692,170 @@
                   </a:schemeClr>
                 </a:solidFill>
               </a:rPr>
+              <a:t>II/ Git et Git Hub</a:t>
+            </a:r>
+            <a:endParaRPr lang="en-US" sz="2400" b="1" u="sng" dirty="0">
+              <a:solidFill>
+                <a:schemeClr val="accent1">
+                  <a:lumMod val="75000"/>
+                </a:schemeClr>
+              </a:solidFill>
+            </a:endParaRPr>
+          </a:p>
+        </p:txBody>
+      </p:sp>
+      <p:pic>
+        <p:nvPicPr>
+          <p:cNvPr id="4" name="Image 3">
+            <a:extLst>
+              <a:ext uri="{FF2B5EF4-FFF2-40B4-BE49-F238E27FC236}">
+                <a16:creationId xmlns:a16="http://schemas.microsoft.com/office/drawing/2014/main" id="{7D50A821-9B48-EFB4-12A4-E7534E656B92}"/>
+              </a:ext>
+            </a:extLst>
+          </p:cNvPr>
+          <p:cNvPicPr>
+            <a:picLocks noChangeAspect="1"/>
+          </p:cNvPicPr>
+          <p:nvPr/>
+        </p:nvPicPr>
+        <p:blipFill>
+          <a:blip r:embed="rId2"/>
+          <a:stretch>
+            <a:fillRect/>
+          </a:stretch>
+        </p:blipFill>
+        <p:spPr>
+          <a:xfrm>
+            <a:off x="1962346" y="2536787"/>
+            <a:ext cx="8267307" cy="3145872"/>
+          </a:xfrm>
+          <a:prstGeom prst="rect">
+            <a:avLst/>
+          </a:prstGeom>
+        </p:spPr>
+      </p:pic>
+    </p:spTree>
+    <p:extLst>
+      <p:ext uri="{BB962C8B-B14F-4D97-AF65-F5344CB8AC3E}">
+        <p14:creationId xmlns:p14="http://schemas.microsoft.com/office/powerpoint/2010/main" val="1613361156"/>
+      </p:ext>
+    </p:extLst>
+  </p:cSld>
+  <p:clrMapOvr>
+    <a:masterClrMapping/>
+  </p:clrMapOvr>
+  <mc:AlternateContent xmlns:mc="http://schemas.openxmlformats.org/markup-compatibility/2006" xmlns:p14="http://schemas.microsoft.com/office/powerpoint/2010/main">
+    <mc:Choice Requires="p14">
+      <p:transition spd="med" p14:dur="700">
+        <p:fade/>
+      </p:transition>
+    </mc:Choice>
+    <mc:Fallback xmlns="">
+      <p:transition spd="med">
+        <p:fade/>
+      </p:transition>
+    </mc:Fallback>
+  </mc:AlternateContent>
+</p:sld>
+</file>
+
+<file path=ppt/slides/slide31.xml><?xml version="1.0" encoding="utf-8"?>
+<p:sld xmlns:a="http://schemas.openxmlformats.org/drawingml/2006/main" xmlns:r="http://schemas.openxmlformats.org/officeDocument/2006/relationships" xmlns:p="http://schemas.openxmlformats.org/presentationml/2006/main">
+  <p:cSld>
+    <p:spTree>
+      <p:nvGrpSpPr>
+        <p:cNvPr id="1" name=""/>
+        <p:cNvGrpSpPr/>
+        <p:nvPr/>
+      </p:nvGrpSpPr>
+      <p:grpSpPr>
+        <a:xfrm>
+          <a:off x="0" y="0"/>
+          <a:ext cx="0" cy="0"/>
+          <a:chOff x="0" y="0"/>
+          <a:chExt cx="0" cy="0"/>
+        </a:xfrm>
+      </p:grpSpPr>
+      <p:sp>
+        <p:nvSpPr>
+          <p:cNvPr id="2" name="Titre 1">
+            <a:extLst>
+              <a:ext uri="{FF2B5EF4-FFF2-40B4-BE49-F238E27FC236}">
+                <a16:creationId xmlns:a16="http://schemas.microsoft.com/office/drawing/2014/main" id="{B9CB8986-52A4-6385-C6A1-AD6933FFB237}"/>
+              </a:ext>
+            </a:extLst>
+          </p:cNvPr>
+          <p:cNvSpPr>
+            <a:spLocks noGrp="1"/>
+          </p:cNvSpPr>
+          <p:nvPr>
+            <p:ph type="title"/>
+          </p:nvPr>
+        </p:nvSpPr>
+        <p:spPr/>
+        <p:txBody>
+          <a:bodyPr/>
+          <a:lstStyle/>
+          <a:p>
+            <a:pPr algn="ctr"/>
+            <a:r>
+              <a:rPr lang="fr-FR" dirty="0">
+                <a:solidFill>
+                  <a:schemeClr val="accent1">
+                    <a:lumMod val="75000"/>
+                  </a:schemeClr>
+                </a:solidFill>
+                <a:latin typeface="Copperplate Gothic Bold" panose="020E0705020206020404" pitchFamily="34" charset="0"/>
+              </a:rPr>
+              <a:t>LES OUTILS</a:t>
+            </a:r>
+            <a:endParaRPr lang="en-US" dirty="0">
+              <a:solidFill>
+                <a:schemeClr val="accent1">
+                  <a:lumMod val="75000"/>
+                </a:schemeClr>
+              </a:solidFill>
+              <a:latin typeface="Copperplate Gothic Bold" panose="020E0705020206020404" pitchFamily="34" charset="0"/>
+            </a:endParaRPr>
+          </a:p>
+        </p:txBody>
+      </p:sp>
+      <p:sp>
+        <p:nvSpPr>
+          <p:cNvPr id="5" name="ZoneTexte 4">
+            <a:extLst>
+              <a:ext uri="{FF2B5EF4-FFF2-40B4-BE49-F238E27FC236}">
+                <a16:creationId xmlns:a16="http://schemas.microsoft.com/office/drawing/2014/main" id="{CE01E8F6-9D91-F8D8-90CE-DBF5D2D1610B}"/>
+              </a:ext>
+            </a:extLst>
+          </p:cNvPr>
+          <p:cNvSpPr txBox="1"/>
+          <p:nvPr/>
+        </p:nvSpPr>
+        <p:spPr>
+          <a:xfrm>
+            <a:off x="377072" y="1564849"/>
+            <a:ext cx="5718928" cy="461665"/>
+          </a:xfrm>
+          <a:prstGeom prst="rect">
+            <a:avLst/>
+          </a:prstGeom>
+          <a:noFill/>
+        </p:spPr>
+        <p:txBody>
+          <a:bodyPr wrap="square" rtlCol="0">
+            <a:spAutoFit/>
+          </a:bodyPr>
+          <a:lstStyle/>
+          <a:p>
+            <a:r>
+              <a:rPr lang="fr-FR" sz="2400" b="1" u="sng" dirty="0">
+                <a:solidFill>
+                  <a:schemeClr val="accent1">
+                    <a:lumMod val="75000"/>
+                  </a:schemeClr>
+                </a:solidFill>
+              </a:rPr>
               <a:t>III/ Kanban</a:t>
             </a:r>
             <a:endParaRPr lang="en-US" sz="2400" b="1" u="sng" dirty="0">
@@ -7721,7 +7923,7 @@
 </p:sld>
 </file>
 
-<file path=ppt/slides/slide31.xml><?xml version="1.0" encoding="utf-8"?>
+<file path=ppt/slides/slide32.xml><?xml version="1.0" encoding="utf-8"?>
 <p:sld xmlns:a="http://schemas.openxmlformats.org/drawingml/2006/main" xmlns:r="http://schemas.openxmlformats.org/officeDocument/2006/relationships" xmlns:p="http://schemas.openxmlformats.org/presentationml/2006/main">
   <p:cSld>
     <p:spTree>
@@ -7954,7 +8156,7 @@
                 </a:solidFill>
                 <a:latin typeface="Copperplate Gothic Bold" panose="020E0705020206020404" pitchFamily="34" charset="0"/>
               </a:rPr>
-              <a:t>LES CINQ TÂCHES</a:t>
+              <a:t>PRESENTATION DU SITE</a:t>
             </a:r>
             <a:endParaRPr lang="en-US" dirty="0">
               <a:solidFill>
@@ -7969,10 +8171,10 @@
       </p:sp>
       <p:pic>
         <p:nvPicPr>
-          <p:cNvPr id="4" name="Image 3">
-            <a:extLst>
-              <a:ext uri="{FF2B5EF4-FFF2-40B4-BE49-F238E27FC236}">
-                <a16:creationId xmlns:a16="http://schemas.microsoft.com/office/drawing/2014/main" id="{EEA0F940-08B3-2C0E-9B05-E92FB3EDBDD5}"/>
+          <p:cNvPr id="8" name="Image 7">
+            <a:extLst>
+              <a:ext uri="{FF2B5EF4-FFF2-40B4-BE49-F238E27FC236}">
+                <a16:creationId xmlns:a16="http://schemas.microsoft.com/office/drawing/2014/main" id="{BC649587-F861-AA13-5E00-8E2499F69660}"/>
               </a:ext>
             </a:extLst>
           </p:cNvPr>
@@ -7989,8 +8191,8 @@
         </p:blipFill>
         <p:spPr>
           <a:xfrm>
-            <a:off x="3179947" y="1690688"/>
-            <a:ext cx="5832106" cy="4654333"/>
+            <a:off x="3540085" y="2552057"/>
+            <a:ext cx="5111829" cy="3273756"/>
           </a:xfrm>
           <a:prstGeom prst="rect">
             <a:avLst/>
@@ -8000,7 +8202,7 @@
     </p:spTree>
     <p:extLst>
       <p:ext uri="{BB962C8B-B14F-4D97-AF65-F5344CB8AC3E}">
-        <p14:creationId xmlns:p14="http://schemas.microsoft.com/office/powerpoint/2010/main" val="2925491507"/>
+        <p14:creationId xmlns:p14="http://schemas.microsoft.com/office/powerpoint/2010/main" val="3678563541"/>
       </p:ext>
     </p:extLst>
   </p:cSld>
@@ -8044,7 +8246,7 @@
           <p:cNvPr id="2" name="Titre 1">
             <a:extLst>
               <a:ext uri="{FF2B5EF4-FFF2-40B4-BE49-F238E27FC236}">
-                <a16:creationId xmlns:a16="http://schemas.microsoft.com/office/drawing/2014/main" id="{7E84A5D1-127D-1D31-4CE7-3C8C8455EB1D}"/>
+                <a16:creationId xmlns:a16="http://schemas.microsoft.com/office/drawing/2014/main" id="{B9CB8986-52A4-6385-C6A1-AD6933FFB237}"/>
               </a:ext>
             </a:extLst>
           </p:cNvPr>
@@ -8057,9 +8259,7 @@
         </p:nvSpPr>
         <p:spPr/>
         <p:txBody>
-          <a:bodyPr>
-            <a:normAutofit fontScale="90000"/>
-          </a:bodyPr>
+          <a:bodyPr/>
           <a:lstStyle/>
           <a:p>
             <a:pPr algn="ctr"/>
@@ -8072,39 +8272,25 @@
                 </a:solidFill>
                 <a:latin typeface="Copperplate Gothic Bold" panose="020E0705020206020404" pitchFamily="34" charset="0"/>
               </a:rPr>
-              <a:t>PREMIERE TÂCHE: </a:t>
-            </a:r>
-            <a:br>
-              <a:rPr lang="fr-FR" dirty="0">
-                <a:solidFill>
-                  <a:schemeClr val="accent1">
-                    <a:lumMod val="75000"/>
-                  </a:schemeClr>
-                </a:solidFill>
-                <a:latin typeface="Copperplate Gothic Bold" panose="020E0705020206020404" pitchFamily="34" charset="0"/>
-              </a:rPr>
-            </a:br>
-            <a:r>
-              <a:rPr lang="fr-FR" dirty="0">
-                <a:solidFill>
-                  <a:schemeClr val="accent1">
-                    <a:lumMod val="75000"/>
-                  </a:schemeClr>
-                </a:solidFill>
-                <a:latin typeface="Copperplate Gothic Bold" panose="020E0705020206020404" pitchFamily="34" charset="0"/>
-              </a:rPr>
-              <a:t>RECUPERER DYNAMIQUEMENT LES PROJETS</a:t>
-            </a:r>
-            <a:endParaRPr lang="en-US" dirty="0"/>
+              <a:t>LES CINQ TÂCHES</a:t>
+            </a:r>
+            <a:endParaRPr lang="en-US" dirty="0">
+              <a:solidFill>
+                <a:schemeClr val="accent1">
+                  <a:lumMod val="75000"/>
+                </a:schemeClr>
+              </a:solidFill>
+              <a:latin typeface="Copperplate Gothic Bold" panose="020E0705020206020404" pitchFamily="34" charset="0"/>
+            </a:endParaRPr>
           </a:p>
         </p:txBody>
       </p:sp>
       <p:pic>
         <p:nvPicPr>
-          <p:cNvPr id="5" name="Image 4">
-            <a:extLst>
-              <a:ext uri="{FF2B5EF4-FFF2-40B4-BE49-F238E27FC236}">
-                <a16:creationId xmlns:a16="http://schemas.microsoft.com/office/drawing/2014/main" id="{66EF1DF5-6013-4595-8CE7-819D0D335713}"/>
+          <p:cNvPr id="4" name="Image 3">
+            <a:extLst>
+              <a:ext uri="{FF2B5EF4-FFF2-40B4-BE49-F238E27FC236}">
+                <a16:creationId xmlns:a16="http://schemas.microsoft.com/office/drawing/2014/main" id="{EEA0F940-08B3-2C0E-9B05-E92FB3EDBDD5}"/>
               </a:ext>
             </a:extLst>
           </p:cNvPr>
@@ -8121,8 +8307,8 @@
         </p:blipFill>
         <p:spPr>
           <a:xfrm>
-            <a:off x="2863612" y="2271858"/>
-            <a:ext cx="6464775" cy="3768529"/>
+            <a:off x="3179947" y="1690688"/>
+            <a:ext cx="5832106" cy="4654333"/>
           </a:xfrm>
           <a:prstGeom prst="rect">
             <a:avLst/>
@@ -8132,159 +8318,7 @@
     </p:spTree>
     <p:extLst>
       <p:ext uri="{BB962C8B-B14F-4D97-AF65-F5344CB8AC3E}">
-        <p14:creationId xmlns:p14="http://schemas.microsoft.com/office/powerpoint/2010/main" val="1588563147"/>
-      </p:ext>
-    </p:extLst>
-  </p:cSld>
-  <p:clrMapOvr>
-    <a:masterClrMapping/>
-  </p:clrMapOvr>
-</p:sld>
-</file>
-
-<file path=ppt/slides/slide6.xml><?xml version="1.0" encoding="utf-8"?>
-<p:sld xmlns:a="http://schemas.openxmlformats.org/drawingml/2006/main" xmlns:r="http://schemas.openxmlformats.org/officeDocument/2006/relationships" xmlns:p="http://schemas.openxmlformats.org/presentationml/2006/main">
-  <p:cSld>
-    <p:spTree>
-      <p:nvGrpSpPr>
-        <p:cNvPr id="1" name=""/>
-        <p:cNvGrpSpPr/>
-        <p:nvPr/>
-      </p:nvGrpSpPr>
-      <p:grpSpPr>
-        <a:xfrm>
-          <a:off x="0" y="0"/>
-          <a:ext cx="0" cy="0"/>
-          <a:chOff x="0" y="0"/>
-          <a:chExt cx="0" cy="0"/>
-        </a:xfrm>
-      </p:grpSpPr>
-      <p:sp>
-        <p:nvSpPr>
-          <p:cNvPr id="2" name="Titre 1">
-            <a:extLst>
-              <a:ext uri="{FF2B5EF4-FFF2-40B4-BE49-F238E27FC236}">
-                <a16:creationId xmlns:a16="http://schemas.microsoft.com/office/drawing/2014/main" id="{B9CB8986-52A4-6385-C6A1-AD6933FFB237}"/>
-              </a:ext>
-            </a:extLst>
-          </p:cNvPr>
-          <p:cNvSpPr>
-            <a:spLocks noGrp="1"/>
-          </p:cNvSpPr>
-          <p:nvPr>
-            <p:ph type="title"/>
-          </p:nvPr>
-        </p:nvSpPr>
-        <p:spPr/>
-        <p:txBody>
-          <a:bodyPr/>
-          <a:lstStyle/>
-          <a:p>
-            <a:pPr algn="ctr"/>
-            <a:r>
-              <a:rPr lang="fr-FR" dirty="0">
-                <a:solidFill>
-                  <a:schemeClr val="accent1">
-                    <a:lumMod val="75000"/>
-                  </a:schemeClr>
-                </a:solidFill>
-                <a:latin typeface="Copperplate Gothic Bold" panose="020E0705020206020404" pitchFamily="34" charset="0"/>
-              </a:rPr>
-              <a:t>RECUPERER DYNAMIQUEMENT LES PROJETS</a:t>
-            </a:r>
-            <a:endParaRPr lang="en-US" dirty="0">
-              <a:solidFill>
-                <a:schemeClr val="accent1">
-                  <a:lumMod val="75000"/>
-                </a:schemeClr>
-              </a:solidFill>
-              <a:latin typeface="Copperplate Gothic Bold" panose="020E0705020206020404" pitchFamily="34" charset="0"/>
-            </a:endParaRPr>
-          </a:p>
-        </p:txBody>
-      </p:sp>
-      <p:sp>
-        <p:nvSpPr>
-          <p:cNvPr id="5" name="ZoneTexte 4">
-            <a:extLst>
-              <a:ext uri="{FF2B5EF4-FFF2-40B4-BE49-F238E27FC236}">
-                <a16:creationId xmlns:a16="http://schemas.microsoft.com/office/drawing/2014/main" id="{CE01E8F6-9D91-F8D8-90CE-DBF5D2D1610B}"/>
-              </a:ext>
-            </a:extLst>
-          </p:cNvPr>
-          <p:cNvSpPr txBox="1"/>
-          <p:nvPr/>
-        </p:nvSpPr>
-        <p:spPr>
-          <a:xfrm>
-            <a:off x="377072" y="1564849"/>
-            <a:ext cx="2234153" cy="461665"/>
-          </a:xfrm>
-          <a:prstGeom prst="rect">
-            <a:avLst/>
-          </a:prstGeom>
-          <a:noFill/>
-        </p:spPr>
-        <p:txBody>
-          <a:bodyPr wrap="square" rtlCol="0">
-            <a:spAutoFit/>
-          </a:bodyPr>
-          <a:lstStyle/>
-          <a:p>
-            <a:r>
-              <a:rPr lang="fr-FR" sz="2400" b="1" u="sng" dirty="0">
-                <a:solidFill>
-                  <a:schemeClr val="accent1">
-                    <a:lumMod val="75000"/>
-                  </a:schemeClr>
-                </a:solidFill>
-              </a:rPr>
-              <a:t>I/ Le HTML</a:t>
-            </a:r>
-            <a:endParaRPr lang="en-US" sz="2400" b="1" u="sng" dirty="0">
-              <a:solidFill>
-                <a:schemeClr val="accent1">
-                  <a:lumMod val="75000"/>
-                </a:schemeClr>
-              </a:solidFill>
-            </a:endParaRPr>
-          </a:p>
-        </p:txBody>
-      </p:sp>
-      <p:pic>
-        <p:nvPicPr>
-          <p:cNvPr id="6" name="Image 5">
-            <a:extLst>
-              <a:ext uri="{FF2B5EF4-FFF2-40B4-BE49-F238E27FC236}">
-                <a16:creationId xmlns:a16="http://schemas.microsoft.com/office/drawing/2014/main" id="{F5504397-0B0C-A763-ADDB-4DD8AEB33569}"/>
-              </a:ext>
-            </a:extLst>
-          </p:cNvPr>
-          <p:cNvPicPr>
-            <a:picLocks noChangeAspect="1"/>
-          </p:cNvPicPr>
-          <p:nvPr/>
-        </p:nvPicPr>
-        <p:blipFill>
-          <a:blip r:embed="rId2"/>
-          <a:stretch>
-            <a:fillRect/>
-          </a:stretch>
-        </p:blipFill>
-        <p:spPr>
-          <a:xfrm>
-            <a:off x="1185177" y="2686615"/>
-            <a:ext cx="9821646" cy="3162741"/>
-          </a:xfrm>
-          <a:prstGeom prst="rect">
-            <a:avLst/>
-          </a:prstGeom>
-        </p:spPr>
-      </p:pic>
-    </p:spTree>
-    <p:extLst>
-      <p:ext uri="{BB962C8B-B14F-4D97-AF65-F5344CB8AC3E}">
-        <p14:creationId xmlns:p14="http://schemas.microsoft.com/office/powerpoint/2010/main" val="2468363010"/>
+        <p14:creationId xmlns:p14="http://schemas.microsoft.com/office/powerpoint/2010/main" val="2925491507"/>
       </p:ext>
     </p:extLst>
   </p:cSld>
@@ -8306,6 +8340,126 @@
 </p:sld>
 </file>
 
+<file path=ppt/slides/slide6.xml><?xml version="1.0" encoding="utf-8"?>
+<p:sld xmlns:a="http://schemas.openxmlformats.org/drawingml/2006/main" xmlns:r="http://schemas.openxmlformats.org/officeDocument/2006/relationships" xmlns:p="http://schemas.openxmlformats.org/presentationml/2006/main">
+  <p:cSld>
+    <p:spTree>
+      <p:nvGrpSpPr>
+        <p:cNvPr id="1" name=""/>
+        <p:cNvGrpSpPr/>
+        <p:nvPr/>
+      </p:nvGrpSpPr>
+      <p:grpSpPr>
+        <a:xfrm>
+          <a:off x="0" y="0"/>
+          <a:ext cx="0" cy="0"/>
+          <a:chOff x="0" y="0"/>
+          <a:chExt cx="0" cy="0"/>
+        </a:xfrm>
+      </p:grpSpPr>
+      <p:sp>
+        <p:nvSpPr>
+          <p:cNvPr id="2" name="Titre 1">
+            <a:extLst>
+              <a:ext uri="{FF2B5EF4-FFF2-40B4-BE49-F238E27FC236}">
+                <a16:creationId xmlns:a16="http://schemas.microsoft.com/office/drawing/2014/main" id="{7E84A5D1-127D-1D31-4CE7-3C8C8455EB1D}"/>
+              </a:ext>
+            </a:extLst>
+          </p:cNvPr>
+          <p:cNvSpPr>
+            <a:spLocks noGrp="1"/>
+          </p:cNvSpPr>
+          <p:nvPr>
+            <p:ph type="title"/>
+          </p:nvPr>
+        </p:nvSpPr>
+        <p:spPr/>
+        <p:txBody>
+          <a:bodyPr>
+            <a:normAutofit fontScale="90000"/>
+          </a:bodyPr>
+          <a:lstStyle/>
+          <a:p>
+            <a:pPr algn="ctr"/>
+            <a:r>
+              <a:rPr lang="fr-FR" dirty="0">
+                <a:solidFill>
+                  <a:schemeClr val="accent1">
+                    <a:lumMod val="75000"/>
+                  </a:schemeClr>
+                </a:solidFill>
+                <a:latin typeface="Copperplate Gothic Bold" panose="020E0705020206020404" pitchFamily="34" charset="0"/>
+              </a:rPr>
+              <a:t>PREMIERE TÂCHE: </a:t>
+            </a:r>
+            <a:br>
+              <a:rPr lang="fr-FR" dirty="0">
+                <a:solidFill>
+                  <a:schemeClr val="accent1">
+                    <a:lumMod val="75000"/>
+                  </a:schemeClr>
+                </a:solidFill>
+                <a:latin typeface="Copperplate Gothic Bold" panose="020E0705020206020404" pitchFamily="34" charset="0"/>
+              </a:rPr>
+            </a:br>
+            <a:r>
+              <a:rPr lang="fr-FR" dirty="0">
+                <a:solidFill>
+                  <a:schemeClr val="accent1">
+                    <a:lumMod val="75000"/>
+                  </a:schemeClr>
+                </a:solidFill>
+                <a:latin typeface="Copperplate Gothic Bold" panose="020E0705020206020404" pitchFamily="34" charset="0"/>
+              </a:rPr>
+              <a:t>RECUPERER DYNAMIQUEMENT LES PROJETS</a:t>
+            </a:r>
+            <a:endParaRPr lang="en-US" dirty="0"/>
+          </a:p>
+        </p:txBody>
+      </p:sp>
+      <p:pic>
+        <p:nvPicPr>
+          <p:cNvPr id="5" name="Image 4">
+            <a:extLst>
+              <a:ext uri="{FF2B5EF4-FFF2-40B4-BE49-F238E27FC236}">
+                <a16:creationId xmlns:a16="http://schemas.microsoft.com/office/drawing/2014/main" id="{66EF1DF5-6013-4595-8CE7-819D0D335713}"/>
+              </a:ext>
+            </a:extLst>
+          </p:cNvPr>
+          <p:cNvPicPr>
+            <a:picLocks noChangeAspect="1"/>
+          </p:cNvPicPr>
+          <p:nvPr/>
+        </p:nvPicPr>
+        <p:blipFill>
+          <a:blip r:embed="rId2"/>
+          <a:stretch>
+            <a:fillRect/>
+          </a:stretch>
+        </p:blipFill>
+        <p:spPr>
+          <a:xfrm>
+            <a:off x="2863612" y="2271858"/>
+            <a:ext cx="6464775" cy="3768529"/>
+          </a:xfrm>
+          <a:prstGeom prst="rect">
+            <a:avLst/>
+          </a:prstGeom>
+        </p:spPr>
+      </p:pic>
+    </p:spTree>
+    <p:extLst>
+      <p:ext uri="{BB962C8B-B14F-4D97-AF65-F5344CB8AC3E}">
+        <p14:creationId xmlns:p14="http://schemas.microsoft.com/office/powerpoint/2010/main" val="1588563147"/>
+      </p:ext>
+    </p:extLst>
+  </p:cSld>
+  <p:clrMapOvr>
+    <a:masterClrMapping/>
+  </p:clrMapOvr>
+</p:sld>
+</file>
+
 <file path=ppt/slides/slide7.xml><?xml version="1.0" encoding="utf-8"?>
 <p:sld xmlns:a="http://schemas.openxmlformats.org/drawingml/2006/main" xmlns:r="http://schemas.openxmlformats.org/officeDocument/2006/relationships" xmlns:p="http://schemas.openxmlformats.org/presentationml/2006/main">
   <p:cSld>
@@ -8358,7 +8512,9 @@
             </a:r>
             <a:endParaRPr lang="en-US" dirty="0">
               <a:solidFill>
-                <a:srgbClr val="0070C0"/>
+                <a:schemeClr val="accent1">
+                  <a:lumMod val="75000"/>
+                </a:schemeClr>
               </a:solidFill>
               <a:latin typeface="Copperplate Gothic Bold" panose="020E0705020206020404" pitchFamily="34" charset="0"/>
             </a:endParaRPr>
@@ -8379,8 +8535,8 @@
         </p:nvSpPr>
         <p:spPr>
           <a:xfrm>
-            <a:off x="377072" y="1550900"/>
-            <a:ext cx="7249213" cy="461665"/>
+            <a:off x="377072" y="1564849"/>
+            <a:ext cx="2234153" cy="461665"/>
           </a:xfrm>
           <a:prstGeom prst="rect">
             <a:avLst/>
@@ -8401,7 +8557,7 @@
                   </a:schemeClr>
                 </a:solidFill>
               </a:rPr>
-              <a:t>II/ Le code javascript</a:t>
+              <a:t>I/ Le HTML</a:t>
             </a:r>
             <a:endParaRPr lang="en-US" sz="2400" b="1" u="sng" dirty="0">
               <a:solidFill>
@@ -8415,10 +8571,10 @@
       </p:sp>
       <p:pic>
         <p:nvPicPr>
-          <p:cNvPr id="8" name="Image 7">
-            <a:extLst>
-              <a:ext uri="{FF2B5EF4-FFF2-40B4-BE49-F238E27FC236}">
-                <a16:creationId xmlns:a16="http://schemas.microsoft.com/office/drawing/2014/main" id="{53E78F5C-7ED0-C6E7-D685-FD262311B730}"/>
+          <p:cNvPr id="6" name="Image 5">
+            <a:extLst>
+              <a:ext uri="{FF2B5EF4-FFF2-40B4-BE49-F238E27FC236}">
+                <a16:creationId xmlns:a16="http://schemas.microsoft.com/office/drawing/2014/main" id="{F5504397-0B0C-A763-ADDB-4DD8AEB33569}"/>
               </a:ext>
             </a:extLst>
           </p:cNvPr>
@@ -8435,8 +8591,8 @@
         </p:blipFill>
         <p:spPr>
           <a:xfrm>
-            <a:off x="3219937" y="2187785"/>
-            <a:ext cx="5752126" cy="4155475"/>
+            <a:off x="1185177" y="2686615"/>
+            <a:ext cx="9821646" cy="3162741"/>
           </a:xfrm>
           <a:prstGeom prst="rect">
             <a:avLst/>
@@ -8446,7 +8602,7 @@
     </p:spTree>
     <p:extLst>
       <p:ext uri="{BB962C8B-B14F-4D97-AF65-F5344CB8AC3E}">
-        <p14:creationId xmlns:p14="http://schemas.microsoft.com/office/powerpoint/2010/main" val="3352684338"/>
+        <p14:creationId xmlns:p14="http://schemas.microsoft.com/office/powerpoint/2010/main" val="2468363010"/>
       </p:ext>
     </p:extLst>
   </p:cSld>
@@ -8490,7 +8646,7 @@
           <p:cNvPr id="2" name="Titre 1">
             <a:extLst>
               <a:ext uri="{FF2B5EF4-FFF2-40B4-BE49-F238E27FC236}">
-                <a16:creationId xmlns:a16="http://schemas.microsoft.com/office/drawing/2014/main" id="{7E84A5D1-127D-1D31-4CE7-3C8C8455EB1D}"/>
+                <a16:creationId xmlns:a16="http://schemas.microsoft.com/office/drawing/2014/main" id="{B9CB8986-52A4-6385-C6A1-AD6933FFB237}"/>
               </a:ext>
             </a:extLst>
           </p:cNvPr>
@@ -8503,9 +8659,7 @@
         </p:nvSpPr>
         <p:spPr/>
         <p:txBody>
-          <a:bodyPr>
-            <a:normAutofit fontScale="90000"/>
-          </a:bodyPr>
+          <a:bodyPr/>
           <a:lstStyle/>
           <a:p>
             <a:pPr algn="ctr"/>
@@ -8518,39 +8672,71 @@
                 </a:solidFill>
                 <a:latin typeface="Copperplate Gothic Bold" panose="020E0705020206020404" pitchFamily="34" charset="0"/>
               </a:rPr>
-              <a:t>DEUXIEME TÂCHE: </a:t>
-            </a:r>
-            <a:br>
-              <a:rPr lang="fr-FR" dirty="0">
+              <a:t>RECUPERER DYNAMIQUEMENT LES PROJETS</a:t>
+            </a:r>
+            <a:endParaRPr lang="en-US" dirty="0">
+              <a:solidFill>
+                <a:srgbClr val="0070C0"/>
+              </a:solidFill>
+              <a:latin typeface="Copperplate Gothic Bold" panose="020E0705020206020404" pitchFamily="34" charset="0"/>
+            </a:endParaRPr>
+          </a:p>
+        </p:txBody>
+      </p:sp>
+      <p:sp>
+        <p:nvSpPr>
+          <p:cNvPr id="5" name="ZoneTexte 4">
+            <a:extLst>
+              <a:ext uri="{FF2B5EF4-FFF2-40B4-BE49-F238E27FC236}">
+                <a16:creationId xmlns:a16="http://schemas.microsoft.com/office/drawing/2014/main" id="{CE01E8F6-9D91-F8D8-90CE-DBF5D2D1610B}"/>
+              </a:ext>
+            </a:extLst>
+          </p:cNvPr>
+          <p:cNvSpPr txBox="1"/>
+          <p:nvPr/>
+        </p:nvSpPr>
+        <p:spPr>
+          <a:xfrm>
+            <a:off x="377072" y="1550900"/>
+            <a:ext cx="7249213" cy="461665"/>
+          </a:xfrm>
+          <a:prstGeom prst="rect">
+            <a:avLst/>
+          </a:prstGeom>
+          <a:noFill/>
+        </p:spPr>
+        <p:txBody>
+          <a:bodyPr wrap="square" rtlCol="0">
+            <a:spAutoFit/>
+          </a:bodyPr>
+          <a:lstStyle/>
+          <a:p>
+            <a:r>
+              <a:rPr lang="fr-FR" sz="2400" b="1" u="sng" dirty="0">
                 <a:solidFill>
                   <a:schemeClr val="accent1">
                     <a:lumMod val="75000"/>
                   </a:schemeClr>
                 </a:solidFill>
-                <a:latin typeface="Copperplate Gothic Bold" panose="020E0705020206020404" pitchFamily="34" charset="0"/>
               </a:rPr>
-            </a:br>
-            <a:r>
-              <a:rPr lang="fr-FR" dirty="0">
-                <a:solidFill>
-                  <a:schemeClr val="accent1">
-                    <a:lumMod val="75000"/>
-                  </a:schemeClr>
-                </a:solidFill>
-                <a:latin typeface="Copperplate Gothic Bold" panose="020E0705020206020404" pitchFamily="34" charset="0"/>
-              </a:rPr>
-              <a:t>AJOUTER DES BOUTONS POUR FILTRER LES PROJETS</a:t>
-            </a:r>
-            <a:endParaRPr lang="en-US" dirty="0"/>
+              <a:t>II/ Le code javascript</a:t>
+            </a:r>
+            <a:endParaRPr lang="en-US" sz="2400" b="1" u="sng" dirty="0">
+              <a:solidFill>
+                <a:schemeClr val="accent1">
+                  <a:lumMod val="75000"/>
+                </a:schemeClr>
+              </a:solidFill>
+            </a:endParaRPr>
           </a:p>
         </p:txBody>
       </p:sp>
       <p:pic>
         <p:nvPicPr>
-          <p:cNvPr id="4" name="Image 3">
-            <a:extLst>
-              <a:ext uri="{FF2B5EF4-FFF2-40B4-BE49-F238E27FC236}">
-                <a16:creationId xmlns:a16="http://schemas.microsoft.com/office/drawing/2014/main" id="{E65D75F3-79FB-88D5-7FE7-866731AD4C1E}"/>
+          <p:cNvPr id="8" name="Image 7">
+            <a:extLst>
+              <a:ext uri="{FF2B5EF4-FFF2-40B4-BE49-F238E27FC236}">
+                <a16:creationId xmlns:a16="http://schemas.microsoft.com/office/drawing/2014/main" id="{53E78F5C-7ED0-C6E7-D685-FD262311B730}"/>
               </a:ext>
             </a:extLst>
           </p:cNvPr>
@@ -8567,38 +8753,8 @@
         </p:blipFill>
         <p:spPr>
           <a:xfrm>
-            <a:off x="838200" y="2856322"/>
-            <a:ext cx="5735403" cy="3004593"/>
-          </a:xfrm>
-          <a:prstGeom prst="rect">
-            <a:avLst/>
-          </a:prstGeom>
-        </p:spPr>
-      </p:pic>
-      <p:pic>
-        <p:nvPicPr>
-          <p:cNvPr id="7" name="Image 6">
-            <a:extLst>
-              <a:ext uri="{FF2B5EF4-FFF2-40B4-BE49-F238E27FC236}">
-                <a16:creationId xmlns:a16="http://schemas.microsoft.com/office/drawing/2014/main" id="{44415526-2A1C-613B-A7CA-4E21EAA4FC55}"/>
-              </a:ext>
-            </a:extLst>
-          </p:cNvPr>
-          <p:cNvPicPr>
-            <a:picLocks noChangeAspect="1"/>
-          </p:cNvPicPr>
-          <p:nvPr/>
-        </p:nvPicPr>
-        <p:blipFill>
-          <a:blip r:embed="rId3"/>
-          <a:stretch>
-            <a:fillRect/>
-          </a:stretch>
-        </p:blipFill>
-        <p:spPr>
-          <a:xfrm>
-            <a:off x="6708194" y="2721740"/>
-            <a:ext cx="5111829" cy="3273756"/>
+            <a:off x="3219937" y="2187785"/>
+            <a:ext cx="5752126" cy="4155475"/>
           </a:xfrm>
           <a:prstGeom prst="rect">
             <a:avLst/>
@@ -8608,13 +8764,25 @@
     </p:spTree>
     <p:extLst>
       <p:ext uri="{BB962C8B-B14F-4D97-AF65-F5344CB8AC3E}">
-        <p14:creationId xmlns:p14="http://schemas.microsoft.com/office/powerpoint/2010/main" val="690912296"/>
+        <p14:creationId xmlns:p14="http://schemas.microsoft.com/office/powerpoint/2010/main" val="3352684338"/>
       </p:ext>
     </p:extLst>
   </p:cSld>
   <p:clrMapOvr>
     <a:masterClrMapping/>
   </p:clrMapOvr>
+  <mc:AlternateContent xmlns:mc="http://schemas.openxmlformats.org/markup-compatibility/2006" xmlns:p14="http://schemas.microsoft.com/office/powerpoint/2010/main">
+    <mc:Choice Requires="p14">
+      <p:transition spd="med" p14:dur="700">
+        <p:fade/>
+      </p:transition>
+    </mc:Choice>
+    <mc:Fallback xmlns="">
+      <p:transition spd="med">
+        <p:fade/>
+      </p:transition>
+    </mc:Fallback>
+  </mc:AlternateContent>
 </p:sld>
 </file>
 
@@ -8640,7 +8808,7 @@
           <p:cNvPr id="2" name="Titre 1">
             <a:extLst>
               <a:ext uri="{FF2B5EF4-FFF2-40B4-BE49-F238E27FC236}">
-                <a16:creationId xmlns:a16="http://schemas.microsoft.com/office/drawing/2014/main" id="{B9CB8986-52A4-6385-C6A1-AD6933FFB237}"/>
+                <a16:creationId xmlns:a16="http://schemas.microsoft.com/office/drawing/2014/main" id="{7E84A5D1-127D-1D31-4CE7-3C8C8455EB1D}"/>
               </a:ext>
             </a:extLst>
           </p:cNvPr>
@@ -8653,7 +8821,9 @@
         </p:nvSpPr>
         <p:spPr/>
         <p:txBody>
-          <a:bodyPr/>
+          <a:bodyPr>
+            <a:normAutofit fontScale="90000"/>
+          </a:bodyPr>
           <a:lstStyle/>
           <a:p>
             <a:pPr algn="ctr"/>
@@ -8666,108 +8836,39 @@
                 </a:solidFill>
                 <a:latin typeface="Copperplate Gothic Bold" panose="020E0705020206020404" pitchFamily="34" charset="0"/>
               </a:rPr>
-              <a:t>LE FILTRE DES PROJETS</a:t>
-            </a:r>
-            <a:endParaRPr lang="en-US" dirty="0">
-              <a:solidFill>
-                <a:schemeClr val="accent1">
-                  <a:lumMod val="75000"/>
-                </a:schemeClr>
-              </a:solidFill>
-              <a:latin typeface="Copperplate Gothic Bold" panose="020E0705020206020404" pitchFamily="34" charset="0"/>
-            </a:endParaRPr>
-          </a:p>
-        </p:txBody>
-      </p:sp>
-      <p:sp>
-        <p:nvSpPr>
-          <p:cNvPr id="5" name="ZoneTexte 4">
-            <a:extLst>
-              <a:ext uri="{FF2B5EF4-FFF2-40B4-BE49-F238E27FC236}">
-                <a16:creationId xmlns:a16="http://schemas.microsoft.com/office/drawing/2014/main" id="{CE01E8F6-9D91-F8D8-90CE-DBF5D2D1610B}"/>
-              </a:ext>
-            </a:extLst>
-          </p:cNvPr>
-          <p:cNvSpPr txBox="1"/>
-          <p:nvPr/>
-        </p:nvSpPr>
-        <p:spPr>
-          <a:xfrm>
-            <a:off x="377072" y="1564849"/>
-            <a:ext cx="7249213" cy="461665"/>
-          </a:xfrm>
-          <a:prstGeom prst="rect">
-            <a:avLst/>
-          </a:prstGeom>
-          <a:noFill/>
-        </p:spPr>
-        <p:txBody>
-          <a:bodyPr wrap="square" rtlCol="0">
-            <a:spAutoFit/>
-          </a:bodyPr>
-          <a:lstStyle/>
-          <a:p>
-            <a:pPr marL="0" marR="0" lvl="0" indent="0" algn="l" defTabSz="914400" rtl="0" eaLnBrk="1" fontAlgn="auto" latinLnBrk="0" hangingPunct="1">
-              <a:lnSpc>
-                <a:spcPct val="100000"/>
-              </a:lnSpc>
-              <a:spcBef>
-                <a:spcPts val="0"/>
-              </a:spcBef>
-              <a:spcAft>
-                <a:spcPts val="0"/>
-              </a:spcAft>
-              <a:buClrTx/>
-              <a:buSzTx/>
-              <a:buFontTx/>
-              <a:buNone/>
-              <a:tabLst/>
-              <a:defRPr/>
-            </a:pPr>
-            <a:r>
-              <a:rPr kumimoji="0" lang="fr-FR" sz="2400" b="1" i="0" u="sng" strike="noStrike" kern="1200" cap="none" spc="0" normalizeH="0" baseline="0" noProof="0" dirty="0">
-                <a:ln>
-                  <a:noFill/>
-                </a:ln>
+              <a:t>DEUXIEME TÂCHE: </a:t>
+            </a:r>
+            <a:br>
+              <a:rPr lang="fr-FR" dirty="0">
                 <a:solidFill>
                   <a:schemeClr val="accent1">
                     <a:lumMod val="75000"/>
                   </a:schemeClr>
                 </a:solidFill>
-                <a:effectLst/>
-                <a:uLnTx/>
-                <a:uFillTx/>
-                <a:latin typeface="Calibri" panose="020F0502020204030204"/>
-                <a:ea typeface="+mn-ea"/>
-                <a:cs typeface="+mn-cs"/>
+                <a:latin typeface="Copperplate Gothic Bold" panose="020E0705020206020404" pitchFamily="34" charset="0"/>
               </a:rPr>
-              <a:t>I/Le HTML</a:t>
-            </a:r>
-            <a:endParaRPr kumimoji="0" lang="en-US" sz="2400" b="1" i="0" u="sng" strike="noStrike" kern="1200" cap="none" spc="0" normalizeH="0" baseline="0" noProof="0" dirty="0">
-              <a:ln>
-                <a:noFill/>
-              </a:ln>
-              <a:solidFill>
-                <a:schemeClr val="accent1">
-                  <a:lumMod val="75000"/>
-                </a:schemeClr>
-              </a:solidFill>
-              <a:effectLst/>
-              <a:uLnTx/>
-              <a:uFillTx/>
-              <a:latin typeface="Calibri" panose="020F0502020204030204"/>
-              <a:ea typeface="+mn-ea"/>
-              <a:cs typeface="+mn-cs"/>
-            </a:endParaRPr>
+            </a:br>
+            <a:r>
+              <a:rPr lang="fr-FR" dirty="0">
+                <a:solidFill>
+                  <a:schemeClr val="accent1">
+                    <a:lumMod val="75000"/>
+                  </a:schemeClr>
+                </a:solidFill>
+                <a:latin typeface="Copperplate Gothic Bold" panose="020E0705020206020404" pitchFamily="34" charset="0"/>
+              </a:rPr>
+              <a:t>AJOUTER DES BOUTONS POUR FILTRER LES PROJETS</a:t>
+            </a:r>
+            <a:endParaRPr lang="en-US" dirty="0"/>
           </a:p>
         </p:txBody>
       </p:sp>
       <p:pic>
         <p:nvPicPr>
-          <p:cNvPr id="6" name="Image 5">
-            <a:extLst>
-              <a:ext uri="{FF2B5EF4-FFF2-40B4-BE49-F238E27FC236}">
-                <a16:creationId xmlns:a16="http://schemas.microsoft.com/office/drawing/2014/main" id="{C4B982D0-B906-F53D-06CF-9B17D530712E}"/>
+          <p:cNvPr id="4" name="Image 3">
+            <a:extLst>
+              <a:ext uri="{FF2B5EF4-FFF2-40B4-BE49-F238E27FC236}">
+                <a16:creationId xmlns:a16="http://schemas.microsoft.com/office/drawing/2014/main" id="{E65D75F3-79FB-88D5-7FE7-866731AD4C1E}"/>
               </a:ext>
             </a:extLst>
           </p:cNvPr>
@@ -8784,8 +8885,38 @@
         </p:blipFill>
         <p:spPr>
           <a:xfrm>
-            <a:off x="1656730" y="2766920"/>
-            <a:ext cx="8878539" cy="1324160"/>
+            <a:off x="838200" y="2856322"/>
+            <a:ext cx="5735403" cy="3004593"/>
+          </a:xfrm>
+          <a:prstGeom prst="rect">
+            <a:avLst/>
+          </a:prstGeom>
+        </p:spPr>
+      </p:pic>
+      <p:pic>
+        <p:nvPicPr>
+          <p:cNvPr id="7" name="Image 6">
+            <a:extLst>
+              <a:ext uri="{FF2B5EF4-FFF2-40B4-BE49-F238E27FC236}">
+                <a16:creationId xmlns:a16="http://schemas.microsoft.com/office/drawing/2014/main" id="{44415526-2A1C-613B-A7CA-4E21EAA4FC55}"/>
+              </a:ext>
+            </a:extLst>
+          </p:cNvPr>
+          <p:cNvPicPr>
+            <a:picLocks noChangeAspect="1"/>
+          </p:cNvPicPr>
+          <p:nvPr/>
+        </p:nvPicPr>
+        <p:blipFill>
+          <a:blip r:embed="rId3"/>
+          <a:stretch>
+            <a:fillRect/>
+          </a:stretch>
+        </p:blipFill>
+        <p:spPr>
+          <a:xfrm>
+            <a:off x="6708194" y="2721740"/>
+            <a:ext cx="5111829" cy="3273756"/>
           </a:xfrm>
           <a:prstGeom prst="rect">
             <a:avLst/>
@@ -8795,25 +8926,13 @@
     </p:spTree>
     <p:extLst>
       <p:ext uri="{BB962C8B-B14F-4D97-AF65-F5344CB8AC3E}">
-        <p14:creationId xmlns:p14="http://schemas.microsoft.com/office/powerpoint/2010/main" val="3176178817"/>
+        <p14:creationId xmlns:p14="http://schemas.microsoft.com/office/powerpoint/2010/main" val="690912296"/>
       </p:ext>
     </p:extLst>
   </p:cSld>
   <p:clrMapOvr>
     <a:masterClrMapping/>
   </p:clrMapOvr>
-  <mc:AlternateContent xmlns:mc="http://schemas.openxmlformats.org/markup-compatibility/2006" xmlns:p14="http://schemas.microsoft.com/office/powerpoint/2010/main">
-    <mc:Choice Requires="p14">
-      <p:transition spd="med" p14:dur="700">
-        <p:fade/>
-      </p:transition>
-    </mc:Choice>
-    <mc:Fallback xmlns="">
-      <p:transition spd="med">
-        <p:fade/>
-      </p:transition>
-    </mc:Fallback>
-  </mc:AlternateContent>
 </p:sld>
 </file>
 

</xml_diff>